<commit_message>
dodanie slajdu o zdarzeniach
</commit_message>
<xml_diff>
--- a/jpwp.pptx
+++ b/jpwp.pptx
@@ -9,6 +9,7 @@
     <p:sldId id="257" r:id="rId3"/>
     <p:sldId id="258" r:id="rId4"/>
     <p:sldId id="259" r:id="rId5"/>
+    <p:sldId id="260" r:id="rId6"/>
   </p:sldIdLst>
   <p:sldSz cx="12192000" cy="6858000"/>
   <p:notesSz cx="6858000" cy="9144000"/>
@@ -262,7 +263,7 @@
           <a:p>
             <a:fld id="{9AC3A7CD-4834-4FFD-B13D-F22368C4D1BC}" type="datetimeFigureOut">
               <a:rPr lang="pl-PL" smtClean="0"/>
-              <a:t>23.03.2024</a:t>
+              <a:t>28.03.2024</a:t>
             </a:fld>
             <a:endParaRPr lang="pl-PL"/>
           </a:p>
@@ -460,7 +461,7 @@
           <a:p>
             <a:fld id="{9AC3A7CD-4834-4FFD-B13D-F22368C4D1BC}" type="datetimeFigureOut">
               <a:rPr lang="pl-PL" smtClean="0"/>
-              <a:t>23.03.2024</a:t>
+              <a:t>28.03.2024</a:t>
             </a:fld>
             <a:endParaRPr lang="pl-PL"/>
           </a:p>
@@ -668,7 +669,7 @@
           <a:p>
             <a:fld id="{9AC3A7CD-4834-4FFD-B13D-F22368C4D1BC}" type="datetimeFigureOut">
               <a:rPr lang="pl-PL" smtClean="0"/>
-              <a:t>23.03.2024</a:t>
+              <a:t>28.03.2024</a:t>
             </a:fld>
             <a:endParaRPr lang="pl-PL"/>
           </a:p>
@@ -866,7 +867,7 @@
           <a:p>
             <a:fld id="{9AC3A7CD-4834-4FFD-B13D-F22368C4D1BC}" type="datetimeFigureOut">
               <a:rPr lang="pl-PL" smtClean="0"/>
-              <a:t>23.03.2024</a:t>
+              <a:t>28.03.2024</a:t>
             </a:fld>
             <a:endParaRPr lang="pl-PL"/>
           </a:p>
@@ -1141,7 +1142,7 @@
           <a:p>
             <a:fld id="{9AC3A7CD-4834-4FFD-B13D-F22368C4D1BC}" type="datetimeFigureOut">
               <a:rPr lang="pl-PL" smtClean="0"/>
-              <a:t>23.03.2024</a:t>
+              <a:t>28.03.2024</a:t>
             </a:fld>
             <a:endParaRPr lang="pl-PL"/>
           </a:p>
@@ -1406,7 +1407,7 @@
           <a:p>
             <a:fld id="{9AC3A7CD-4834-4FFD-B13D-F22368C4D1BC}" type="datetimeFigureOut">
               <a:rPr lang="pl-PL" smtClean="0"/>
-              <a:t>23.03.2024</a:t>
+              <a:t>28.03.2024</a:t>
             </a:fld>
             <a:endParaRPr lang="pl-PL"/>
           </a:p>
@@ -1818,7 +1819,7 @@
           <a:p>
             <a:fld id="{9AC3A7CD-4834-4FFD-B13D-F22368C4D1BC}" type="datetimeFigureOut">
               <a:rPr lang="pl-PL" smtClean="0"/>
-              <a:t>23.03.2024</a:t>
+              <a:t>28.03.2024</a:t>
             </a:fld>
             <a:endParaRPr lang="pl-PL"/>
           </a:p>
@@ -1959,7 +1960,7 @@
           <a:p>
             <a:fld id="{9AC3A7CD-4834-4FFD-B13D-F22368C4D1BC}" type="datetimeFigureOut">
               <a:rPr lang="pl-PL" smtClean="0"/>
-              <a:t>23.03.2024</a:t>
+              <a:t>28.03.2024</a:t>
             </a:fld>
             <a:endParaRPr lang="pl-PL"/>
           </a:p>
@@ -2072,7 +2073,7 @@
           <a:p>
             <a:fld id="{9AC3A7CD-4834-4FFD-B13D-F22368C4D1BC}" type="datetimeFigureOut">
               <a:rPr lang="pl-PL" smtClean="0"/>
-              <a:t>23.03.2024</a:t>
+              <a:t>28.03.2024</a:t>
             </a:fld>
             <a:endParaRPr lang="pl-PL"/>
           </a:p>
@@ -2383,7 +2384,7 @@
           <a:p>
             <a:fld id="{9AC3A7CD-4834-4FFD-B13D-F22368C4D1BC}" type="datetimeFigureOut">
               <a:rPr lang="pl-PL" smtClean="0"/>
-              <a:t>23.03.2024</a:t>
+              <a:t>28.03.2024</a:t>
             </a:fld>
             <a:endParaRPr lang="pl-PL"/>
           </a:p>
@@ -2671,7 +2672,7 @@
           <a:p>
             <a:fld id="{9AC3A7CD-4834-4FFD-B13D-F22368C4D1BC}" type="datetimeFigureOut">
               <a:rPr lang="pl-PL" smtClean="0"/>
-              <a:t>23.03.2024</a:t>
+              <a:t>28.03.2024</a:t>
             </a:fld>
             <a:endParaRPr lang="pl-PL"/>
           </a:p>
@@ -2912,7 +2913,7 @@
           <a:p>
             <a:fld id="{9AC3A7CD-4834-4FFD-B13D-F22368C4D1BC}" type="datetimeFigureOut">
               <a:rPr lang="pl-PL" smtClean="0"/>
-              <a:t>23.03.2024</a:t>
+              <a:t>28.03.2024</a:t>
             </a:fld>
             <a:endParaRPr lang="pl-PL"/>
           </a:p>
@@ -3648,6 +3649,194 @@
     <p:extLst>
       <p:ext uri="{BB962C8B-B14F-4D97-AF65-F5344CB8AC3E}">
         <p14:creationId xmlns:p14="http://schemas.microsoft.com/office/powerpoint/2010/main" val="844388364"/>
+      </p:ext>
+    </p:extLst>
+  </p:cSld>
+  <p:clrMapOvr>
+    <a:masterClrMapping/>
+  </p:clrMapOvr>
+</p:sld>
+</file>
+
+<file path=ppt/slides/slide5.xml><?xml version="1.0" encoding="utf-8"?>
+<p:sld xmlns:a="http://schemas.openxmlformats.org/drawingml/2006/main" xmlns:r="http://schemas.openxmlformats.org/officeDocument/2006/relationships" xmlns:p="http://schemas.openxmlformats.org/presentationml/2006/main">
+  <p:cSld>
+    <p:spTree>
+      <p:nvGrpSpPr>
+        <p:cNvPr id="1" name=""/>
+        <p:cNvGrpSpPr/>
+        <p:nvPr/>
+      </p:nvGrpSpPr>
+      <p:grpSpPr>
+        <a:xfrm>
+          <a:off x="0" y="0"/>
+          <a:ext cx="0" cy="0"/>
+          <a:chOff x="0" y="0"/>
+          <a:chExt cx="0" cy="0"/>
+        </a:xfrm>
+      </p:grpSpPr>
+      <p:sp>
+        <p:nvSpPr>
+          <p:cNvPr id="2" name="Tytuł 1">
+            <a:extLst>
+              <a:ext uri="{FF2B5EF4-FFF2-40B4-BE49-F238E27FC236}">
+                <a16:creationId xmlns:a16="http://schemas.microsoft.com/office/drawing/2014/main" id="{7F6D5825-75CF-BDCD-202E-398E6817A3A7}"/>
+              </a:ext>
+            </a:extLst>
+          </p:cNvPr>
+          <p:cNvSpPr>
+            <a:spLocks noGrp="1"/>
+          </p:cNvSpPr>
+          <p:nvPr>
+            <p:ph type="title"/>
+          </p:nvPr>
+        </p:nvSpPr>
+        <p:spPr>
+          <a:xfrm>
+            <a:off x="0" y="-250397"/>
+            <a:ext cx="12192000" cy="1325563"/>
+          </a:xfrm>
+          <a:solidFill>
+            <a:schemeClr val="accent2">
+              <a:lumMod val="75000"/>
+            </a:schemeClr>
+          </a:solidFill>
+        </p:spPr>
+        <p:txBody>
+          <a:bodyPr/>
+          <a:lstStyle/>
+          <a:p>
+            <a:r>
+              <a:rPr lang="pl-PL" dirty="0"/>
+              <a:t>POWIĄZANIE ZDARZEŃ</a:t>
+            </a:r>
+          </a:p>
+        </p:txBody>
+      </p:sp>
+      <p:pic>
+        <p:nvPicPr>
+          <p:cNvPr id="7" name="Obraz 6">
+            <a:extLst>
+              <a:ext uri="{FF2B5EF4-FFF2-40B4-BE49-F238E27FC236}">
+                <a16:creationId xmlns:a16="http://schemas.microsoft.com/office/drawing/2014/main" id="{EF9CBBD5-CFE2-F2CC-5F25-6896371B57CD}"/>
+              </a:ext>
+            </a:extLst>
+          </p:cNvPr>
+          <p:cNvPicPr>
+            <a:picLocks noChangeAspect="1"/>
+          </p:cNvPicPr>
+          <p:nvPr/>
+        </p:nvPicPr>
+        <p:blipFill>
+          <a:blip r:embed="rId2"/>
+          <a:stretch>
+            <a:fillRect/>
+          </a:stretch>
+        </p:blipFill>
+        <p:spPr>
+          <a:xfrm>
+            <a:off x="334782" y="2723750"/>
+            <a:ext cx="1126641" cy="1836579"/>
+          </a:xfrm>
+          <a:prstGeom prst="rect">
+            <a:avLst/>
+          </a:prstGeom>
+        </p:spPr>
+      </p:pic>
+      <p:pic>
+        <p:nvPicPr>
+          <p:cNvPr id="11" name="Obraz 10">
+            <a:extLst>
+              <a:ext uri="{FF2B5EF4-FFF2-40B4-BE49-F238E27FC236}">
+                <a16:creationId xmlns:a16="http://schemas.microsoft.com/office/drawing/2014/main" id="{9A22F9F5-A6D7-7568-CAC2-D22B5228D747}"/>
+              </a:ext>
+            </a:extLst>
+          </p:cNvPr>
+          <p:cNvPicPr>
+            <a:picLocks noChangeAspect="1"/>
+          </p:cNvPicPr>
+          <p:nvPr/>
+        </p:nvPicPr>
+        <p:blipFill>
+          <a:blip r:embed="rId3"/>
+          <a:stretch>
+            <a:fillRect/>
+          </a:stretch>
+        </p:blipFill>
+        <p:spPr>
+          <a:xfrm>
+            <a:off x="334782" y="4696765"/>
+            <a:ext cx="1120237" cy="1848784"/>
+          </a:xfrm>
+          <a:prstGeom prst="rect">
+            <a:avLst/>
+          </a:prstGeom>
+        </p:spPr>
+      </p:pic>
+      <p:pic>
+        <p:nvPicPr>
+          <p:cNvPr id="13" name="Obraz 12">
+            <a:extLst>
+              <a:ext uri="{FF2B5EF4-FFF2-40B4-BE49-F238E27FC236}">
+                <a16:creationId xmlns:a16="http://schemas.microsoft.com/office/drawing/2014/main" id="{AC4544F6-5D18-3E16-AD81-FA46AEE9A164}"/>
+              </a:ext>
+            </a:extLst>
+          </p:cNvPr>
+          <p:cNvPicPr>
+            <a:picLocks noChangeAspect="1"/>
+          </p:cNvPicPr>
+          <p:nvPr/>
+        </p:nvPicPr>
+        <p:blipFill>
+          <a:blip r:embed="rId4"/>
+          <a:stretch>
+            <a:fillRect/>
+          </a:stretch>
+        </p:blipFill>
+        <p:spPr>
+          <a:xfrm>
+            <a:off x="334783" y="750735"/>
+            <a:ext cx="1120237" cy="1836579"/>
+          </a:xfrm>
+          <a:prstGeom prst="rect">
+            <a:avLst/>
+          </a:prstGeom>
+        </p:spPr>
+      </p:pic>
+      <p:pic>
+        <p:nvPicPr>
+          <p:cNvPr id="15" name="Obraz 14">
+            <a:extLst>
+              <a:ext uri="{FF2B5EF4-FFF2-40B4-BE49-F238E27FC236}">
+                <a16:creationId xmlns:a16="http://schemas.microsoft.com/office/drawing/2014/main" id="{26AE2AB2-5223-AFC5-71A4-DC2D542BEA15}"/>
+              </a:ext>
+            </a:extLst>
+          </p:cNvPr>
+          <p:cNvPicPr>
+            <a:picLocks noChangeAspect="1"/>
+          </p:cNvPicPr>
+          <p:nvPr/>
+        </p:nvPicPr>
+        <p:blipFill>
+          <a:blip r:embed="rId5"/>
+          <a:stretch>
+            <a:fillRect/>
+          </a:stretch>
+        </p:blipFill>
+        <p:spPr>
+          <a:xfrm>
+            <a:off x="3184189" y="750734"/>
+            <a:ext cx="8349050" cy="5797299"/>
+          </a:xfrm>
+          <a:prstGeom prst="rect">
+            <a:avLst/>
+          </a:prstGeom>
+        </p:spPr>
+      </p:pic>
+    </p:spTree>
+    <p:extLst>
+      <p:ext uri="{BB962C8B-B14F-4D97-AF65-F5344CB8AC3E}">
+        <p14:creationId xmlns:p14="http://schemas.microsoft.com/office/powerpoint/2010/main" val="1505706312"/>
       </p:ext>
     </p:extLst>
   </p:cSld>

</xml_diff>

<commit_message>
dodanie krotkiego wstepu, slajdow o tabeli z Qt
</commit_message>
<xml_diff>
--- a/jpwp.pptx
+++ b/jpwp.pptx
@@ -6,10 +6,13 @@
   </p:sldMasterIdLst>
   <p:sldIdLst>
     <p:sldId id="256" r:id="rId2"/>
-    <p:sldId id="257" r:id="rId3"/>
-    <p:sldId id="258" r:id="rId4"/>
-    <p:sldId id="259" r:id="rId5"/>
-    <p:sldId id="260" r:id="rId6"/>
+    <p:sldId id="263" r:id="rId3"/>
+    <p:sldId id="257" r:id="rId4"/>
+    <p:sldId id="261" r:id="rId5"/>
+    <p:sldId id="258" r:id="rId6"/>
+    <p:sldId id="259" r:id="rId7"/>
+    <p:sldId id="262" r:id="rId8"/>
+    <p:sldId id="260" r:id="rId9"/>
   </p:sldIdLst>
   <p:sldSz cx="12192000" cy="6858000"/>
   <p:notesSz cx="6858000" cy="9144000"/>
@@ -263,7 +266,7 @@
           <a:p>
             <a:fld id="{9AC3A7CD-4834-4FFD-B13D-F22368C4D1BC}" type="datetimeFigureOut">
               <a:rPr lang="pl-PL" smtClean="0"/>
-              <a:t>28.03.2024</a:t>
+              <a:t>29.03.2024</a:t>
             </a:fld>
             <a:endParaRPr lang="pl-PL"/>
           </a:p>
@@ -461,7 +464,7 @@
           <a:p>
             <a:fld id="{9AC3A7CD-4834-4FFD-B13D-F22368C4D1BC}" type="datetimeFigureOut">
               <a:rPr lang="pl-PL" smtClean="0"/>
-              <a:t>28.03.2024</a:t>
+              <a:t>29.03.2024</a:t>
             </a:fld>
             <a:endParaRPr lang="pl-PL"/>
           </a:p>
@@ -669,7 +672,7 @@
           <a:p>
             <a:fld id="{9AC3A7CD-4834-4FFD-B13D-F22368C4D1BC}" type="datetimeFigureOut">
               <a:rPr lang="pl-PL" smtClean="0"/>
-              <a:t>28.03.2024</a:t>
+              <a:t>29.03.2024</a:t>
             </a:fld>
             <a:endParaRPr lang="pl-PL"/>
           </a:p>
@@ -867,7 +870,7 @@
           <a:p>
             <a:fld id="{9AC3A7CD-4834-4FFD-B13D-F22368C4D1BC}" type="datetimeFigureOut">
               <a:rPr lang="pl-PL" smtClean="0"/>
-              <a:t>28.03.2024</a:t>
+              <a:t>29.03.2024</a:t>
             </a:fld>
             <a:endParaRPr lang="pl-PL"/>
           </a:p>
@@ -1142,7 +1145,7 @@
           <a:p>
             <a:fld id="{9AC3A7CD-4834-4FFD-B13D-F22368C4D1BC}" type="datetimeFigureOut">
               <a:rPr lang="pl-PL" smtClean="0"/>
-              <a:t>28.03.2024</a:t>
+              <a:t>29.03.2024</a:t>
             </a:fld>
             <a:endParaRPr lang="pl-PL"/>
           </a:p>
@@ -1407,7 +1410,7 @@
           <a:p>
             <a:fld id="{9AC3A7CD-4834-4FFD-B13D-F22368C4D1BC}" type="datetimeFigureOut">
               <a:rPr lang="pl-PL" smtClean="0"/>
-              <a:t>28.03.2024</a:t>
+              <a:t>29.03.2024</a:t>
             </a:fld>
             <a:endParaRPr lang="pl-PL"/>
           </a:p>
@@ -1819,7 +1822,7 @@
           <a:p>
             <a:fld id="{9AC3A7CD-4834-4FFD-B13D-F22368C4D1BC}" type="datetimeFigureOut">
               <a:rPr lang="pl-PL" smtClean="0"/>
-              <a:t>28.03.2024</a:t>
+              <a:t>29.03.2024</a:t>
             </a:fld>
             <a:endParaRPr lang="pl-PL"/>
           </a:p>
@@ -1960,7 +1963,7 @@
           <a:p>
             <a:fld id="{9AC3A7CD-4834-4FFD-B13D-F22368C4D1BC}" type="datetimeFigureOut">
               <a:rPr lang="pl-PL" smtClean="0"/>
-              <a:t>28.03.2024</a:t>
+              <a:t>29.03.2024</a:t>
             </a:fld>
             <a:endParaRPr lang="pl-PL"/>
           </a:p>
@@ -2073,7 +2076,7 @@
           <a:p>
             <a:fld id="{9AC3A7CD-4834-4FFD-B13D-F22368C4D1BC}" type="datetimeFigureOut">
               <a:rPr lang="pl-PL" smtClean="0"/>
-              <a:t>28.03.2024</a:t>
+              <a:t>29.03.2024</a:t>
             </a:fld>
             <a:endParaRPr lang="pl-PL"/>
           </a:p>
@@ -2384,7 +2387,7 @@
           <a:p>
             <a:fld id="{9AC3A7CD-4834-4FFD-B13D-F22368C4D1BC}" type="datetimeFigureOut">
               <a:rPr lang="pl-PL" smtClean="0"/>
-              <a:t>28.03.2024</a:t>
+              <a:t>29.03.2024</a:t>
             </a:fld>
             <a:endParaRPr lang="pl-PL"/>
           </a:p>
@@ -2672,7 +2675,7 @@
           <a:p>
             <a:fld id="{9AC3A7CD-4834-4FFD-B13D-F22368C4D1BC}" type="datetimeFigureOut">
               <a:rPr lang="pl-PL" smtClean="0"/>
-              <a:t>28.03.2024</a:t>
+              <a:t>29.03.2024</a:t>
             </a:fld>
             <a:endParaRPr lang="pl-PL"/>
           </a:p>
@@ -2913,7 +2916,7 @@
           <a:p>
             <a:fld id="{9AC3A7CD-4834-4FFD-B13D-F22368C4D1BC}" type="datetimeFigureOut">
               <a:rPr lang="pl-PL" smtClean="0"/>
-              <a:t>28.03.2024</a:t>
+              <a:t>29.03.2024</a:t>
             </a:fld>
             <a:endParaRPr lang="pl-PL"/>
           </a:p>
@@ -3438,10 +3441,61 @@
       </p:grpSpPr>
       <p:sp>
         <p:nvSpPr>
+          <p:cNvPr id="6" name="Prostokąt 5">
+            <a:extLst>
+              <a:ext uri="{FF2B5EF4-FFF2-40B4-BE49-F238E27FC236}">
+                <a16:creationId xmlns:a16="http://schemas.microsoft.com/office/drawing/2014/main" id="{970908D2-94D5-0929-9D75-E4B12B826A85}"/>
+              </a:ext>
+            </a:extLst>
+          </p:cNvPr>
+          <p:cNvSpPr/>
+          <p:nvPr/>
+        </p:nvSpPr>
+        <p:spPr>
+          <a:xfrm>
+            <a:off x="0" y="0"/>
+            <a:ext cx="12192000" cy="902266"/>
+          </a:xfrm>
+          <a:prstGeom prst="rect">
+            <a:avLst/>
+          </a:prstGeom>
+          <a:solidFill>
+            <a:schemeClr val="accent2">
+              <a:lumMod val="75000"/>
+            </a:schemeClr>
+          </a:solidFill>
+        </p:spPr>
+        <p:style>
+          <a:lnRef idx="2">
+            <a:schemeClr val="accent1">
+              <a:shade val="15000"/>
+            </a:schemeClr>
+          </a:lnRef>
+          <a:fillRef idx="1">
+            <a:schemeClr val="accent1"/>
+          </a:fillRef>
+          <a:effectRef idx="0">
+            <a:schemeClr val="accent1"/>
+          </a:effectRef>
+          <a:fontRef idx="minor">
+            <a:schemeClr val="lt1"/>
+          </a:fontRef>
+        </p:style>
+        <p:txBody>
+          <a:bodyPr rtlCol="0" anchor="ctr"/>
+          <a:lstStyle/>
+          <a:p>
+            <a:pPr algn="ctr"/>
+            <a:endParaRPr lang="pl-PL"/>
+          </a:p>
+        </p:txBody>
+      </p:sp>
+      <p:sp>
+        <p:nvSpPr>
           <p:cNvPr id="2" name="Tytuł 1">
             <a:extLst>
               <a:ext uri="{FF2B5EF4-FFF2-40B4-BE49-F238E27FC236}">
-                <a16:creationId xmlns:a16="http://schemas.microsoft.com/office/drawing/2014/main" id="{B76C569E-9576-8559-0E27-AD1C3248971E}"/>
+                <a16:creationId xmlns:a16="http://schemas.microsoft.com/office/drawing/2014/main" id="{E78FE2DC-1B4E-16EA-1925-E326DE828A03}"/>
               </a:ext>
             </a:extLst>
           </p:cNvPr>
@@ -3452,7 +3506,12 @@
             <p:ph type="title"/>
           </p:nvPr>
         </p:nvSpPr>
-        <p:spPr/>
+        <p:spPr>
+          <a:xfrm>
+            <a:off x="838200" y="-153035"/>
+            <a:ext cx="10515600" cy="1325563"/>
+          </a:xfrm>
+        </p:spPr>
         <p:txBody>
           <a:bodyPr>
             <a:normAutofit/>
@@ -3461,42 +3520,1199 @@
           <a:p>
             <a:pPr algn="ctr"/>
             <a:r>
-              <a:rPr lang="pl-PL" sz="5400" dirty="0" err="1"/>
-              <a:t>QtDesigner</a:t>
-            </a:r>
-            <a:endParaRPr lang="pl-PL" sz="5400" dirty="0"/>
-          </a:p>
-        </p:txBody>
-      </p:sp>
-      <p:sp>
-        <p:nvSpPr>
-          <p:cNvPr id="3" name="Symbol zastępczy zawartości 2">
-            <a:extLst>
-              <a:ext uri="{FF2B5EF4-FFF2-40B4-BE49-F238E27FC236}">
-                <a16:creationId xmlns:a16="http://schemas.microsoft.com/office/drawing/2014/main" id="{469B423E-48CF-5BC1-6391-52EF9BA8845B}"/>
-              </a:ext>
-            </a:extLst>
-          </p:cNvPr>
-          <p:cNvSpPr>
-            <a:spLocks noGrp="1"/>
+              <a:rPr lang="pl-PL" sz="5000" dirty="0"/>
+              <a:t>KRÓTKI WSTĘP</a:t>
+            </a:r>
+          </a:p>
+        </p:txBody>
+      </p:sp>
+      <p:sp>
+        <p:nvSpPr>
+          <p:cNvPr id="4" name="Rectangle 1">
+            <a:extLst>
+              <a:ext uri="{FF2B5EF4-FFF2-40B4-BE49-F238E27FC236}">
+                <a16:creationId xmlns:a16="http://schemas.microsoft.com/office/drawing/2014/main" id="{F2147DC1-01A3-4FE6-CB12-EC08B498B247}"/>
+              </a:ext>
+            </a:extLst>
+          </p:cNvPr>
+          <p:cNvSpPr>
+            <a:spLocks noGrp="1" noChangeArrowheads="1"/>
           </p:cNvSpPr>
           <p:nvPr>
             <p:ph idx="1"/>
           </p:nvPr>
         </p:nvSpPr>
-        <p:spPr/>
-        <p:txBody>
-          <a:bodyPr/>
+        <p:spPr bwMode="auto">
+          <a:xfrm>
+            <a:off x="0" y="902266"/>
+            <a:ext cx="12192000" cy="5955734"/>
+          </a:xfrm>
+          <a:prstGeom prst="rect">
+            <a:avLst/>
+          </a:prstGeom>
+          <a:solidFill>
+            <a:srgbClr val="212121"/>
+          </a:solidFill>
+          <a:ln>
+            <a:noFill/>
+          </a:ln>
+          <a:effectLst/>
+          <a:extLst>
+            <a:ext uri="{91240B29-F687-4F45-9708-019B960494DF}">
+              <a14:hiddenLine xmlns:a14="http://schemas.microsoft.com/office/drawing/2010/main" w="9525">
+                <a:solidFill>
+                  <a:schemeClr val="tx1"/>
+                </a:solidFill>
+                <a:miter lim="800000"/>
+                <a:headEnd/>
+                <a:tailEnd/>
+              </a14:hiddenLine>
+            </a:ext>
+            <a:ext uri="{AF507438-7753-43E0-B8FC-AC1667EBCBE1}">
+              <a14:hiddenEffects xmlns:a14="http://schemas.microsoft.com/office/drawing/2010/main">
+                <a:effectLst>
+                  <a:outerShdw dist="35921" dir="2700000" algn="ctr" rotWithShape="0">
+                    <a:schemeClr val="bg2"/>
+                  </a:outerShdw>
+                </a:effectLst>
+              </a14:hiddenEffects>
+            </a:ext>
+          </a:extLst>
+        </p:spPr>
+        <p:txBody>
+          <a:bodyPr vert="horz" wrap="square" lIns="0" tIns="0" rIns="0" bIns="198375" numCol="1" anchor="ctr" anchorCtr="0" compatLnSpc="1">
+            <a:prstTxWarp prst="textNoShape">
+              <a:avLst/>
+            </a:prstTxWarp>
+            <a:spAutoFit/>
+          </a:bodyPr>
           <a:lstStyle/>
           <a:p>
-            <a:endParaRPr lang="pl-PL" dirty="0"/>
+            <a:pPr marL="0" marR="0" lvl="0" indent="0" algn="l" defTabSz="914400" rtl="0" eaLnBrk="0" fontAlgn="base" latinLnBrk="0" hangingPunct="0">
+              <a:lnSpc>
+                <a:spcPct val="100000"/>
+              </a:lnSpc>
+              <a:spcBef>
+                <a:spcPct val="0"/>
+              </a:spcBef>
+              <a:spcAft>
+                <a:spcPct val="0"/>
+              </a:spcAft>
+              <a:buClrTx/>
+              <a:buSzTx/>
+              <a:buFontTx/>
+              <a:buNone/>
+              <a:tabLst/>
+            </a:pPr>
+            <a:r>
+              <a:rPr kumimoji="0" lang="pl-PL" altLang="pl-PL" sz="1700" b="1" i="0" u="none" strike="noStrike" cap="none" normalizeH="0" baseline="0" dirty="0">
+                <a:ln>
+                  <a:noFill/>
+                </a:ln>
+                <a:solidFill>
+                  <a:srgbClr val="ECECEC"/>
+                </a:solidFill>
+                <a:effectLst/>
+                <a:cs typeface="Times New Roman" panose="02020603050405020304" pitchFamily="18" charset="0"/>
+              </a:rPr>
+              <a:t>Struktura interfejsu użytkownika:</a:t>
+            </a:r>
+          </a:p>
+          <a:p>
+            <a:pPr marL="0" marR="0" lvl="0" indent="0" algn="l" defTabSz="914400" rtl="0" eaLnBrk="0" fontAlgn="base" latinLnBrk="0" hangingPunct="0">
+              <a:lnSpc>
+                <a:spcPct val="100000"/>
+              </a:lnSpc>
+              <a:spcBef>
+                <a:spcPct val="0"/>
+              </a:spcBef>
+              <a:spcAft>
+                <a:spcPct val="0"/>
+              </a:spcAft>
+              <a:buClrTx/>
+              <a:buSzTx/>
+              <a:buFontTx/>
+              <a:buAutoNum type="arabicPeriod"/>
+              <a:tabLst/>
+            </a:pPr>
+            <a:r>
+              <a:rPr kumimoji="0" lang="pl-PL" altLang="pl-PL" sz="1700" b="1" i="0" u="none" strike="noStrike" cap="none" normalizeH="0" baseline="0" dirty="0">
+                <a:ln>
+                  <a:noFill/>
+                </a:ln>
+                <a:solidFill>
+                  <a:srgbClr val="ECECEC"/>
+                </a:solidFill>
+                <a:effectLst/>
+                <a:cs typeface="Times New Roman" panose="02020603050405020304" pitchFamily="18" charset="0"/>
+              </a:rPr>
+              <a:t>Drzewa i listy</a:t>
+            </a:r>
+            <a:r>
+              <a:rPr kumimoji="0" lang="pl-PL" altLang="pl-PL" sz="1700" b="0" i="0" u="none" strike="noStrike" cap="none" normalizeH="0" baseline="0" dirty="0">
+                <a:ln>
+                  <a:noFill/>
+                </a:ln>
+                <a:solidFill>
+                  <a:srgbClr val="ECECEC"/>
+                </a:solidFill>
+                <a:effectLst/>
+                <a:cs typeface="Times New Roman" panose="02020603050405020304" pitchFamily="18" charset="0"/>
+              </a:rPr>
+              <a:t>: W PyQt6 i </a:t>
+            </a:r>
+            <a:r>
+              <a:rPr kumimoji="0" lang="pl-PL" altLang="pl-PL" sz="1700" b="0" i="0" u="none" strike="noStrike" cap="none" normalizeH="0" baseline="0" dirty="0" err="1">
+                <a:ln>
+                  <a:noFill/>
+                </a:ln>
+                <a:solidFill>
+                  <a:srgbClr val="ECECEC"/>
+                </a:solidFill>
+                <a:effectLst/>
+                <a:cs typeface="Times New Roman" panose="02020603050405020304" pitchFamily="18" charset="0"/>
+              </a:rPr>
+              <a:t>Tkinter</a:t>
+            </a:r>
+            <a:r>
+              <a:rPr kumimoji="0" lang="pl-PL" altLang="pl-PL" sz="1700" b="0" i="0" u="none" strike="noStrike" cap="none" normalizeH="0" baseline="0" dirty="0">
+                <a:ln>
+                  <a:noFill/>
+                </a:ln>
+                <a:solidFill>
+                  <a:srgbClr val="ECECEC"/>
+                </a:solidFill>
+                <a:effectLst/>
+                <a:cs typeface="Times New Roman" panose="02020603050405020304" pitchFamily="18" charset="0"/>
+              </a:rPr>
+              <a:t> istnieją widżety takie jak </a:t>
+            </a:r>
+            <a:r>
+              <a:rPr kumimoji="0" lang="pl-PL" altLang="pl-PL" sz="1700" b="1" i="0" u="none" strike="noStrike" cap="none" normalizeH="0" baseline="0" dirty="0" err="1">
+                <a:ln>
+                  <a:noFill/>
+                </a:ln>
+                <a:solidFill>
+                  <a:srgbClr val="ECECEC"/>
+                </a:solidFill>
+                <a:effectLst/>
+                <a:cs typeface="Times New Roman" panose="02020603050405020304" pitchFamily="18" charset="0"/>
+              </a:rPr>
+              <a:t>QTreeView</a:t>
+            </a:r>
+            <a:r>
+              <a:rPr kumimoji="0" lang="pl-PL" altLang="pl-PL" sz="1700" b="0" i="0" u="none" strike="noStrike" cap="none" normalizeH="0" baseline="0" dirty="0">
+                <a:ln>
+                  <a:noFill/>
+                </a:ln>
+                <a:solidFill>
+                  <a:srgbClr val="ECECEC"/>
+                </a:solidFill>
+                <a:effectLst/>
+                <a:cs typeface="Times New Roman" panose="02020603050405020304" pitchFamily="18" charset="0"/>
+              </a:rPr>
+              <a:t>, </a:t>
+            </a:r>
+            <a:r>
+              <a:rPr kumimoji="0" lang="pl-PL" altLang="pl-PL" sz="1700" b="1" i="0" u="none" strike="noStrike" cap="none" normalizeH="0" baseline="0" dirty="0" err="1">
+                <a:ln>
+                  <a:noFill/>
+                </a:ln>
+                <a:solidFill>
+                  <a:srgbClr val="ECECEC"/>
+                </a:solidFill>
+                <a:effectLst/>
+                <a:cs typeface="Times New Roman" panose="02020603050405020304" pitchFamily="18" charset="0"/>
+              </a:rPr>
+              <a:t>QListView</a:t>
+            </a:r>
+            <a:r>
+              <a:rPr kumimoji="0" lang="pl-PL" altLang="pl-PL" sz="1700" b="0" i="0" u="none" strike="noStrike" cap="none" normalizeH="0" baseline="0" dirty="0">
+                <a:ln>
+                  <a:noFill/>
+                </a:ln>
+                <a:solidFill>
+                  <a:srgbClr val="ECECEC"/>
+                </a:solidFill>
+                <a:effectLst/>
+                <a:cs typeface="Times New Roman" panose="02020603050405020304" pitchFamily="18" charset="0"/>
+              </a:rPr>
+              <a:t> w PyQt6, oraz </a:t>
+            </a:r>
+            <a:r>
+              <a:rPr kumimoji="0" lang="pl-PL" altLang="pl-PL" sz="1700" b="1" i="0" u="none" strike="noStrike" cap="none" normalizeH="0" baseline="0" dirty="0" err="1">
+                <a:ln>
+                  <a:noFill/>
+                </a:ln>
+                <a:solidFill>
+                  <a:srgbClr val="ECECEC"/>
+                </a:solidFill>
+                <a:effectLst/>
+                <a:cs typeface="Times New Roman" panose="02020603050405020304" pitchFamily="18" charset="0"/>
+              </a:rPr>
+              <a:t>Treeview</a:t>
+            </a:r>
+            <a:r>
+              <a:rPr kumimoji="0" lang="pl-PL" altLang="pl-PL" sz="1700" b="0" i="0" u="none" strike="noStrike" cap="none" normalizeH="0" baseline="0" dirty="0">
+                <a:ln>
+                  <a:noFill/>
+                </a:ln>
+                <a:solidFill>
+                  <a:srgbClr val="ECECEC"/>
+                </a:solidFill>
+                <a:effectLst/>
+                <a:cs typeface="Times New Roman" panose="02020603050405020304" pitchFamily="18" charset="0"/>
+              </a:rPr>
+              <a:t>, </a:t>
+            </a:r>
+            <a:r>
+              <a:rPr kumimoji="0" lang="pl-PL" altLang="pl-PL" sz="1700" b="1" i="0" u="none" strike="noStrike" cap="none" normalizeH="0" baseline="0" dirty="0" err="1">
+                <a:ln>
+                  <a:noFill/>
+                </a:ln>
+                <a:solidFill>
+                  <a:srgbClr val="ECECEC"/>
+                </a:solidFill>
+                <a:effectLst/>
+                <a:cs typeface="Times New Roman" panose="02020603050405020304" pitchFamily="18" charset="0"/>
+              </a:rPr>
+              <a:t>Listbox</a:t>
+            </a:r>
+            <a:r>
+              <a:rPr kumimoji="0" lang="pl-PL" altLang="pl-PL" sz="1700" b="0" i="0" u="none" strike="noStrike" cap="none" normalizeH="0" baseline="0" dirty="0">
+                <a:ln>
+                  <a:noFill/>
+                </a:ln>
+                <a:solidFill>
+                  <a:srgbClr val="ECECEC"/>
+                </a:solidFill>
+                <a:effectLst/>
+                <a:cs typeface="Times New Roman" panose="02020603050405020304" pitchFamily="18" charset="0"/>
+              </a:rPr>
+              <a:t> w </a:t>
+            </a:r>
+            <a:r>
+              <a:rPr kumimoji="0" lang="pl-PL" altLang="pl-PL" sz="1700" b="0" i="0" u="none" strike="noStrike" cap="none" normalizeH="0" baseline="0" dirty="0" err="1">
+                <a:ln>
+                  <a:noFill/>
+                </a:ln>
+                <a:solidFill>
+                  <a:srgbClr val="ECECEC"/>
+                </a:solidFill>
+                <a:effectLst/>
+                <a:cs typeface="Times New Roman" panose="02020603050405020304" pitchFamily="18" charset="0"/>
+              </a:rPr>
+              <a:t>Tkinter</a:t>
+            </a:r>
+            <a:r>
+              <a:rPr kumimoji="0" lang="pl-PL" altLang="pl-PL" sz="1700" b="0" i="0" u="none" strike="noStrike" cap="none" normalizeH="0" baseline="0" dirty="0">
+                <a:ln>
+                  <a:noFill/>
+                </a:ln>
+                <a:solidFill>
+                  <a:srgbClr val="ECECEC"/>
+                </a:solidFill>
+                <a:effectLst/>
+                <a:cs typeface="Times New Roman" panose="02020603050405020304" pitchFamily="18" charset="0"/>
+              </a:rPr>
+              <a:t>, które pozwalają na wyświetlanie danych w formie drzewa lub listy.</a:t>
+            </a:r>
+          </a:p>
+          <a:p>
+            <a:pPr marL="0" marR="0" lvl="0" indent="0" algn="l" defTabSz="914400" rtl="0" eaLnBrk="0" fontAlgn="base" latinLnBrk="0" hangingPunct="0">
+              <a:lnSpc>
+                <a:spcPct val="100000"/>
+              </a:lnSpc>
+              <a:spcBef>
+                <a:spcPct val="0"/>
+              </a:spcBef>
+              <a:spcAft>
+                <a:spcPct val="0"/>
+              </a:spcAft>
+              <a:buClrTx/>
+              <a:buSzTx/>
+              <a:buFontTx/>
+              <a:buAutoNum type="arabicPeriod" startAt="2"/>
+              <a:tabLst/>
+            </a:pPr>
+            <a:r>
+              <a:rPr kumimoji="0" lang="pl-PL" altLang="pl-PL" sz="1700" b="1" i="0" u="none" strike="noStrike" cap="none" normalizeH="0" baseline="0" dirty="0">
+                <a:ln>
+                  <a:noFill/>
+                </a:ln>
+                <a:solidFill>
+                  <a:srgbClr val="ECECEC"/>
+                </a:solidFill>
+                <a:effectLst/>
+                <a:cs typeface="Times New Roman" panose="02020603050405020304" pitchFamily="18" charset="0"/>
+              </a:rPr>
+              <a:t>Dokowanie elementów</a:t>
+            </a:r>
+            <a:r>
+              <a:rPr kumimoji="0" lang="pl-PL" altLang="pl-PL" sz="1700" b="0" i="0" u="none" strike="noStrike" cap="none" normalizeH="0" baseline="0" dirty="0">
+                <a:ln>
+                  <a:noFill/>
+                </a:ln>
+                <a:solidFill>
+                  <a:srgbClr val="ECECEC"/>
+                </a:solidFill>
+                <a:effectLst/>
+                <a:cs typeface="Times New Roman" panose="02020603050405020304" pitchFamily="18" charset="0"/>
+              </a:rPr>
+              <a:t>: W obu bibliotekach można dokować widżety do różnych obszarów okna za pomocą menedżerów układów. </a:t>
+            </a:r>
+          </a:p>
+          <a:p>
+            <a:pPr marL="0" marR="0" lvl="0" indent="0" algn="l" defTabSz="914400" rtl="0" eaLnBrk="0" fontAlgn="base" latinLnBrk="0" hangingPunct="0">
+              <a:lnSpc>
+                <a:spcPct val="100000"/>
+              </a:lnSpc>
+              <a:spcBef>
+                <a:spcPct val="0"/>
+              </a:spcBef>
+              <a:spcAft>
+                <a:spcPct val="0"/>
+              </a:spcAft>
+              <a:buClrTx/>
+              <a:buSzTx/>
+              <a:buNone/>
+              <a:tabLst/>
+            </a:pPr>
+            <a:r>
+              <a:rPr kumimoji="0" lang="pl-PL" altLang="pl-PL" sz="1700" b="0" i="0" u="none" strike="noStrike" cap="none" normalizeH="0" baseline="0" dirty="0">
+                <a:ln>
+                  <a:noFill/>
+                </a:ln>
+                <a:solidFill>
+                  <a:srgbClr val="ECECEC"/>
+                </a:solidFill>
+                <a:effectLst/>
+                <a:cs typeface="Times New Roman" panose="02020603050405020304" pitchFamily="18" charset="0"/>
+              </a:rPr>
+              <a:t>Na przykład, w PyQt6 możemy użyć </a:t>
+            </a:r>
+            <a:r>
+              <a:rPr kumimoji="0" lang="pl-PL" altLang="pl-PL" sz="1700" b="1" i="0" u="none" strike="noStrike" cap="none" normalizeH="0" baseline="0" dirty="0" err="1">
+                <a:ln>
+                  <a:noFill/>
+                </a:ln>
+                <a:solidFill>
+                  <a:srgbClr val="ECECEC"/>
+                </a:solidFill>
+                <a:effectLst/>
+                <a:cs typeface="Times New Roman" panose="02020603050405020304" pitchFamily="18" charset="0"/>
+              </a:rPr>
+              <a:t>QVBoxLayout</a:t>
+            </a:r>
+            <a:r>
+              <a:rPr kumimoji="0" lang="pl-PL" altLang="pl-PL" sz="1700" b="0" i="0" u="none" strike="noStrike" cap="none" normalizeH="0" baseline="0" dirty="0">
+                <a:ln>
+                  <a:noFill/>
+                </a:ln>
+                <a:solidFill>
+                  <a:srgbClr val="ECECEC"/>
+                </a:solidFill>
+                <a:effectLst/>
+                <a:cs typeface="Times New Roman" panose="02020603050405020304" pitchFamily="18" charset="0"/>
+              </a:rPr>
+              <a:t>, </a:t>
+            </a:r>
+            <a:r>
+              <a:rPr kumimoji="0" lang="pl-PL" altLang="pl-PL" sz="1700" b="1" i="0" u="none" strike="noStrike" cap="none" normalizeH="0" baseline="0" dirty="0" err="1">
+                <a:ln>
+                  <a:noFill/>
+                </a:ln>
+                <a:solidFill>
+                  <a:srgbClr val="ECECEC"/>
+                </a:solidFill>
+                <a:effectLst/>
+                <a:cs typeface="Times New Roman" panose="02020603050405020304" pitchFamily="18" charset="0"/>
+              </a:rPr>
+              <a:t>QHBoxLayout</a:t>
+            </a:r>
+            <a:r>
+              <a:rPr kumimoji="0" lang="pl-PL" altLang="pl-PL" sz="1700" b="0" i="0" u="none" strike="noStrike" cap="none" normalizeH="0" baseline="0" dirty="0">
+                <a:ln>
+                  <a:noFill/>
+                </a:ln>
+                <a:solidFill>
+                  <a:srgbClr val="ECECEC"/>
+                </a:solidFill>
+                <a:effectLst/>
+                <a:cs typeface="Times New Roman" panose="02020603050405020304" pitchFamily="18" charset="0"/>
+              </a:rPr>
+              <a:t> lub </a:t>
+            </a:r>
+            <a:r>
+              <a:rPr kumimoji="0" lang="pl-PL" altLang="pl-PL" sz="1700" b="1" i="0" u="none" strike="noStrike" cap="none" normalizeH="0" baseline="0" dirty="0" err="1">
+                <a:ln>
+                  <a:noFill/>
+                </a:ln>
+                <a:solidFill>
+                  <a:srgbClr val="ECECEC"/>
+                </a:solidFill>
+                <a:effectLst/>
+                <a:cs typeface="Times New Roman" panose="02020603050405020304" pitchFamily="18" charset="0"/>
+              </a:rPr>
+              <a:t>QGridLayout</a:t>
+            </a:r>
+            <a:r>
+              <a:rPr kumimoji="0" lang="pl-PL" altLang="pl-PL" sz="1700" b="0" i="0" u="none" strike="noStrike" cap="none" normalizeH="0" baseline="0" dirty="0">
+                <a:ln>
+                  <a:noFill/>
+                </a:ln>
+                <a:solidFill>
+                  <a:srgbClr val="ECECEC"/>
+                </a:solidFill>
+                <a:effectLst/>
+                <a:cs typeface="Times New Roman" panose="02020603050405020304" pitchFamily="18" charset="0"/>
+              </a:rPr>
+              <a:t>, aby dokować elementy wertykalnie, horyzontalnie lub w siatce.</a:t>
+            </a:r>
+          </a:p>
+          <a:p>
+            <a:pPr marL="0" marR="0" lvl="0" indent="0" algn="l" defTabSz="914400" rtl="0" eaLnBrk="0" fontAlgn="base" latinLnBrk="0" hangingPunct="0">
+              <a:lnSpc>
+                <a:spcPct val="100000"/>
+              </a:lnSpc>
+              <a:spcBef>
+                <a:spcPct val="0"/>
+              </a:spcBef>
+              <a:spcAft>
+                <a:spcPct val="0"/>
+              </a:spcAft>
+              <a:buClrTx/>
+              <a:buSzTx/>
+              <a:buFontTx/>
+              <a:buAutoNum type="arabicPeriod" startAt="3"/>
+              <a:tabLst/>
+            </a:pPr>
+            <a:r>
+              <a:rPr kumimoji="0" lang="pl-PL" altLang="pl-PL" sz="1700" b="1" i="0" u="none" strike="noStrike" cap="none" normalizeH="0" baseline="0" dirty="0">
+                <a:ln>
+                  <a:noFill/>
+                </a:ln>
+                <a:solidFill>
+                  <a:srgbClr val="ECECEC"/>
+                </a:solidFill>
+                <a:effectLst/>
+                <a:cs typeface="Times New Roman" panose="02020603050405020304" pitchFamily="18" charset="0"/>
+              </a:rPr>
+              <a:t>Pozycje</a:t>
+            </a:r>
+            <a:r>
+              <a:rPr kumimoji="0" lang="pl-PL" altLang="pl-PL" sz="1700" b="0" i="0" u="none" strike="noStrike" cap="none" normalizeH="0" baseline="0" dirty="0">
+                <a:ln>
+                  <a:noFill/>
+                </a:ln>
+                <a:solidFill>
+                  <a:srgbClr val="ECECEC"/>
+                </a:solidFill>
+                <a:effectLst/>
+                <a:cs typeface="Times New Roman" panose="02020603050405020304" pitchFamily="18" charset="0"/>
+              </a:rPr>
+              <a:t>: Pozycje elementów mogą być określone jako relatywne lub absolutne. W PyQt6 możemy użyć kombinacji menedżerów układów i właściwości geometrii widżetów do określenia ich pozycji i rozmiaru w oknie.</a:t>
+            </a:r>
+          </a:p>
+          <a:p>
+            <a:pPr marL="0" marR="0" lvl="0" indent="0" algn="l" defTabSz="914400" rtl="0" eaLnBrk="0" fontAlgn="base" latinLnBrk="0" hangingPunct="0">
+              <a:lnSpc>
+                <a:spcPct val="100000"/>
+              </a:lnSpc>
+              <a:spcBef>
+                <a:spcPct val="0"/>
+              </a:spcBef>
+              <a:spcAft>
+                <a:spcPct val="0"/>
+              </a:spcAft>
+              <a:buClrTx/>
+              <a:buSzTx/>
+              <a:buNone/>
+              <a:tabLst/>
+            </a:pPr>
+            <a:endParaRPr kumimoji="0" lang="pl-PL" altLang="pl-PL" sz="1700" b="1" i="0" u="none" strike="noStrike" cap="none" normalizeH="0" baseline="0" dirty="0">
+              <a:ln>
+                <a:noFill/>
+              </a:ln>
+              <a:solidFill>
+                <a:srgbClr val="ECECEC"/>
+              </a:solidFill>
+              <a:effectLst/>
+              <a:cs typeface="Times New Roman" panose="02020603050405020304" pitchFamily="18" charset="0"/>
+            </a:endParaRPr>
+          </a:p>
+          <a:p>
+            <a:pPr marL="0" marR="0" lvl="0" indent="0" algn="l" defTabSz="914400" rtl="0" eaLnBrk="0" fontAlgn="base" latinLnBrk="0" hangingPunct="0">
+              <a:lnSpc>
+                <a:spcPct val="100000"/>
+              </a:lnSpc>
+              <a:spcBef>
+                <a:spcPct val="0"/>
+              </a:spcBef>
+              <a:spcAft>
+                <a:spcPct val="0"/>
+              </a:spcAft>
+              <a:buClrTx/>
+              <a:buSzTx/>
+              <a:buNone/>
+              <a:tabLst/>
+            </a:pPr>
+            <a:r>
+              <a:rPr kumimoji="0" lang="pl-PL" altLang="pl-PL" sz="1700" b="1" i="0" u="none" strike="noStrike" cap="none" normalizeH="0" baseline="0" dirty="0">
+                <a:ln>
+                  <a:noFill/>
+                </a:ln>
+                <a:solidFill>
+                  <a:srgbClr val="ECECEC"/>
+                </a:solidFill>
+                <a:effectLst/>
+                <a:cs typeface="Times New Roman" panose="02020603050405020304" pitchFamily="18" charset="0"/>
+              </a:rPr>
+              <a:t>Dodawanie własnych elementów:</a:t>
+            </a:r>
+          </a:p>
+          <a:p>
+            <a:pPr marL="0" marR="0" lvl="0" indent="0" algn="l" defTabSz="914400" rtl="0" eaLnBrk="0" fontAlgn="base" latinLnBrk="0" hangingPunct="0">
+              <a:lnSpc>
+                <a:spcPct val="100000"/>
+              </a:lnSpc>
+              <a:spcBef>
+                <a:spcPct val="0"/>
+              </a:spcBef>
+              <a:spcAft>
+                <a:spcPct val="0"/>
+              </a:spcAft>
+              <a:buClrTx/>
+              <a:buSzTx/>
+              <a:buNone/>
+              <a:tabLst/>
+            </a:pPr>
+            <a:r>
+              <a:rPr kumimoji="0" lang="pl-PL" altLang="pl-PL" sz="1700" b="0" i="0" u="none" strike="noStrike" cap="none" normalizeH="0" baseline="0" dirty="0">
+                <a:ln>
+                  <a:noFill/>
+                </a:ln>
+                <a:solidFill>
+                  <a:srgbClr val="ECECEC"/>
+                </a:solidFill>
+                <a:effectLst/>
+                <a:cs typeface="Times New Roman" panose="02020603050405020304" pitchFamily="18" charset="0"/>
+              </a:rPr>
+              <a:t>1.</a:t>
+            </a:r>
+            <a:r>
+              <a:rPr kumimoji="0" lang="pl-PL" altLang="pl-PL" sz="1700" b="1" i="0" u="none" strike="noStrike" cap="none" normalizeH="0" baseline="0" dirty="0">
+                <a:ln>
+                  <a:noFill/>
+                </a:ln>
+                <a:solidFill>
+                  <a:srgbClr val="ECECEC"/>
+                </a:solidFill>
+                <a:effectLst/>
+                <a:cs typeface="Times New Roman" panose="02020603050405020304" pitchFamily="18" charset="0"/>
+              </a:rPr>
+              <a:t>Własne widżety</a:t>
+            </a:r>
+            <a:r>
+              <a:rPr kumimoji="0" lang="pl-PL" altLang="pl-PL" sz="1700" b="0" i="0" u="none" strike="noStrike" cap="none" normalizeH="0" baseline="0" dirty="0">
+                <a:ln>
+                  <a:noFill/>
+                </a:ln>
+                <a:solidFill>
+                  <a:srgbClr val="ECECEC"/>
+                </a:solidFill>
+                <a:effectLst/>
+                <a:cs typeface="Times New Roman" panose="02020603050405020304" pitchFamily="18" charset="0"/>
+              </a:rPr>
+              <a:t>: W obu bibliotekach możemy tworzyć własne widżety dziedzicząc po istniejących lub pisząc je od podstaw.</a:t>
+            </a:r>
+          </a:p>
+          <a:p>
+            <a:pPr marL="0" marR="0" lvl="0" indent="0" algn="l" defTabSz="914400" rtl="0" eaLnBrk="0" fontAlgn="base" latinLnBrk="0" hangingPunct="0">
+              <a:lnSpc>
+                <a:spcPct val="100000"/>
+              </a:lnSpc>
+              <a:spcBef>
+                <a:spcPct val="0"/>
+              </a:spcBef>
+              <a:spcAft>
+                <a:spcPct val="0"/>
+              </a:spcAft>
+              <a:buClrTx/>
+              <a:buSzTx/>
+              <a:buNone/>
+              <a:tabLst/>
+            </a:pPr>
+            <a:r>
+              <a:rPr lang="pl-PL" altLang="pl-PL" sz="1700" dirty="0">
+                <a:solidFill>
+                  <a:srgbClr val="ECECEC"/>
+                </a:solidFill>
+                <a:cs typeface="Times New Roman" panose="02020603050405020304" pitchFamily="18" charset="0"/>
+              </a:rPr>
+              <a:t>2.</a:t>
+            </a:r>
+            <a:r>
+              <a:rPr kumimoji="0" lang="pl-PL" altLang="pl-PL" sz="1700" b="1" i="0" u="none" strike="noStrike" cap="none" normalizeH="0" baseline="0" dirty="0">
+                <a:ln>
+                  <a:noFill/>
+                </a:ln>
+                <a:solidFill>
+                  <a:srgbClr val="ECECEC"/>
+                </a:solidFill>
+                <a:effectLst/>
+                <a:cs typeface="Times New Roman" panose="02020603050405020304" pitchFamily="18" charset="0"/>
+              </a:rPr>
+              <a:t>Niestandardowe malowanie</a:t>
+            </a:r>
+            <a:r>
+              <a:rPr kumimoji="0" lang="pl-PL" altLang="pl-PL" sz="1700" b="0" i="0" u="none" strike="noStrike" cap="none" normalizeH="0" baseline="0" dirty="0">
+                <a:ln>
+                  <a:noFill/>
+                </a:ln>
+                <a:solidFill>
+                  <a:srgbClr val="ECECEC"/>
+                </a:solidFill>
+                <a:effectLst/>
+                <a:cs typeface="Times New Roman" panose="02020603050405020304" pitchFamily="18" charset="0"/>
+              </a:rPr>
+              <a:t>: Możemy rysować na widżetach za pomocą metod takich jak </a:t>
+            </a:r>
+            <a:r>
+              <a:rPr kumimoji="0" lang="pl-PL" altLang="pl-PL" sz="1700" b="0" i="0" u="none" strike="noStrike" cap="none" normalizeH="0" baseline="0" dirty="0" err="1">
+                <a:ln>
+                  <a:noFill/>
+                </a:ln>
+                <a:solidFill>
+                  <a:srgbClr val="ECECEC"/>
+                </a:solidFill>
+                <a:effectLst/>
+                <a:cs typeface="Times New Roman" panose="02020603050405020304" pitchFamily="18" charset="0"/>
+              </a:rPr>
+              <a:t>paintEvent</a:t>
+            </a:r>
+            <a:r>
+              <a:rPr kumimoji="0" lang="pl-PL" altLang="pl-PL" sz="1700" b="0" i="0" u="none" strike="noStrike" cap="none" normalizeH="0" baseline="0" dirty="0">
+                <a:ln>
+                  <a:noFill/>
+                </a:ln>
+                <a:solidFill>
+                  <a:srgbClr val="ECECEC"/>
+                </a:solidFill>
+                <a:effectLst/>
+                <a:cs typeface="Times New Roman" panose="02020603050405020304" pitchFamily="18" charset="0"/>
+              </a:rPr>
+              <a:t>() w PyQt6 lub </a:t>
+            </a:r>
+            <a:r>
+              <a:rPr kumimoji="0" lang="pl-PL" altLang="pl-PL" sz="1700" b="0" i="0" u="none" strike="noStrike" cap="none" normalizeH="0" baseline="0" dirty="0" err="1">
+                <a:ln>
+                  <a:noFill/>
+                </a:ln>
+                <a:solidFill>
+                  <a:srgbClr val="ECECEC"/>
+                </a:solidFill>
+                <a:effectLst/>
+                <a:cs typeface="Times New Roman" panose="02020603050405020304" pitchFamily="18" charset="0"/>
+              </a:rPr>
+              <a:t>Canvas</a:t>
+            </a:r>
+            <a:r>
+              <a:rPr kumimoji="0" lang="pl-PL" altLang="pl-PL" sz="1700" b="0" i="0" u="none" strike="noStrike" cap="none" normalizeH="0" baseline="0" dirty="0">
+                <a:ln>
+                  <a:noFill/>
+                </a:ln>
+                <a:solidFill>
+                  <a:srgbClr val="ECECEC"/>
+                </a:solidFill>
+                <a:effectLst/>
+                <a:cs typeface="Times New Roman" panose="02020603050405020304" pitchFamily="18" charset="0"/>
+              </a:rPr>
+              <a:t> w </a:t>
+            </a:r>
+            <a:r>
+              <a:rPr kumimoji="0" lang="pl-PL" altLang="pl-PL" sz="1700" b="0" i="0" u="none" strike="noStrike" cap="none" normalizeH="0" baseline="0" dirty="0" err="1">
+                <a:ln>
+                  <a:noFill/>
+                </a:ln>
+                <a:solidFill>
+                  <a:srgbClr val="ECECEC"/>
+                </a:solidFill>
+                <a:effectLst/>
+                <a:cs typeface="Times New Roman" panose="02020603050405020304" pitchFamily="18" charset="0"/>
+              </a:rPr>
+              <a:t>Tkinter</a:t>
+            </a:r>
+            <a:r>
+              <a:rPr kumimoji="0" lang="pl-PL" altLang="pl-PL" sz="1700" b="0" i="0" u="none" strike="noStrike" cap="none" normalizeH="0" baseline="0" dirty="0">
+                <a:ln>
+                  <a:noFill/>
+                </a:ln>
+                <a:solidFill>
+                  <a:srgbClr val="ECECEC"/>
+                </a:solidFill>
+                <a:effectLst/>
+                <a:cs typeface="Times New Roman" panose="02020603050405020304" pitchFamily="18" charset="0"/>
+              </a:rPr>
+              <a:t>, aby stworzyć niestandardowe elementy.</a:t>
+            </a:r>
+          </a:p>
+          <a:p>
+            <a:pPr marL="0" marR="0" lvl="0" indent="0" algn="l" defTabSz="914400" rtl="0" eaLnBrk="0" fontAlgn="base" latinLnBrk="0" hangingPunct="0">
+              <a:lnSpc>
+                <a:spcPct val="100000"/>
+              </a:lnSpc>
+              <a:spcBef>
+                <a:spcPct val="0"/>
+              </a:spcBef>
+              <a:spcAft>
+                <a:spcPct val="0"/>
+              </a:spcAft>
+              <a:buClrTx/>
+              <a:buSzTx/>
+              <a:buNone/>
+              <a:tabLst/>
+            </a:pPr>
+            <a:r>
+              <a:rPr kumimoji="0" lang="pl-PL" altLang="pl-PL" sz="1700" b="0" i="0" u="none" strike="noStrike" cap="none" normalizeH="0" baseline="0" dirty="0">
+                <a:ln>
+                  <a:noFill/>
+                </a:ln>
+                <a:solidFill>
+                  <a:srgbClr val="ECECEC"/>
+                </a:solidFill>
+                <a:effectLst/>
+                <a:cs typeface="Times New Roman" panose="02020603050405020304" pitchFamily="18" charset="0"/>
+              </a:rPr>
+              <a:t>3.</a:t>
+            </a:r>
+            <a:r>
+              <a:rPr kumimoji="0" lang="pl-PL" altLang="pl-PL" sz="1700" b="1" i="0" u="none" strike="noStrike" cap="none" normalizeH="0" baseline="0" dirty="0">
+                <a:ln>
+                  <a:noFill/>
+                </a:ln>
+                <a:solidFill>
+                  <a:srgbClr val="ECECEC"/>
+                </a:solidFill>
+                <a:effectLst/>
+                <a:cs typeface="Times New Roman" panose="02020603050405020304" pitchFamily="18" charset="0"/>
+              </a:rPr>
+              <a:t>Stylizacja CSS</a:t>
+            </a:r>
+            <a:r>
+              <a:rPr kumimoji="0" lang="pl-PL" altLang="pl-PL" sz="1700" b="0" i="0" u="none" strike="noStrike" cap="none" normalizeH="0" baseline="0" dirty="0">
+                <a:ln>
+                  <a:noFill/>
+                </a:ln>
+                <a:solidFill>
+                  <a:srgbClr val="ECECEC"/>
+                </a:solidFill>
+                <a:effectLst/>
+                <a:cs typeface="Times New Roman" panose="02020603050405020304" pitchFamily="18" charset="0"/>
+              </a:rPr>
+              <a:t>: W PyQt6 możemy używać arkuszy stylów CSS do dostosowywania wyglądu widżetów.</a:t>
+            </a:r>
+          </a:p>
+          <a:p>
+            <a:pPr marL="0" marR="0" lvl="0" indent="0" algn="l" defTabSz="914400" rtl="0" eaLnBrk="0" fontAlgn="base" latinLnBrk="0" hangingPunct="0">
+              <a:lnSpc>
+                <a:spcPct val="100000"/>
+              </a:lnSpc>
+              <a:spcBef>
+                <a:spcPct val="0"/>
+              </a:spcBef>
+              <a:spcAft>
+                <a:spcPct val="0"/>
+              </a:spcAft>
+              <a:buClrTx/>
+              <a:buSzTx/>
+              <a:buNone/>
+              <a:tabLst/>
+            </a:pPr>
+            <a:endParaRPr kumimoji="0" lang="pl-PL" altLang="pl-PL" sz="1700" b="0" i="0" u="none" strike="noStrike" cap="none" normalizeH="0" baseline="0" dirty="0">
+              <a:ln>
+                <a:noFill/>
+              </a:ln>
+              <a:solidFill>
+                <a:srgbClr val="ECECEC"/>
+              </a:solidFill>
+              <a:effectLst/>
+              <a:cs typeface="Times New Roman" panose="02020603050405020304" pitchFamily="18" charset="0"/>
+            </a:endParaRPr>
+          </a:p>
+          <a:p>
+            <a:pPr marL="0" marR="0" lvl="0" indent="0" algn="l" defTabSz="914400" rtl="0" eaLnBrk="0" fontAlgn="base" latinLnBrk="0" hangingPunct="0">
+              <a:lnSpc>
+                <a:spcPct val="100000"/>
+              </a:lnSpc>
+              <a:spcBef>
+                <a:spcPct val="0"/>
+              </a:spcBef>
+              <a:spcAft>
+                <a:spcPct val="0"/>
+              </a:spcAft>
+              <a:buClrTx/>
+              <a:buSzTx/>
+              <a:buNone/>
+              <a:tabLst/>
+            </a:pPr>
+            <a:r>
+              <a:rPr kumimoji="0" lang="pl-PL" altLang="pl-PL" sz="1700" b="1" i="0" u="none" strike="noStrike" cap="none" normalizeH="0" baseline="0" dirty="0">
+                <a:ln>
+                  <a:noFill/>
+                </a:ln>
+                <a:solidFill>
+                  <a:srgbClr val="ECECEC"/>
+                </a:solidFill>
+                <a:effectLst/>
+                <a:cs typeface="Times New Roman" panose="02020603050405020304" pitchFamily="18" charset="0"/>
+              </a:rPr>
+              <a:t>Obsługa zdarzeń:</a:t>
+            </a:r>
+          </a:p>
+          <a:p>
+            <a:pPr marL="0" marR="0" lvl="0" indent="0" algn="l" defTabSz="914400" rtl="0" eaLnBrk="0" fontAlgn="base" latinLnBrk="0" hangingPunct="0">
+              <a:lnSpc>
+                <a:spcPct val="100000"/>
+              </a:lnSpc>
+              <a:spcBef>
+                <a:spcPct val="0"/>
+              </a:spcBef>
+              <a:spcAft>
+                <a:spcPct val="0"/>
+              </a:spcAft>
+              <a:buClrTx/>
+              <a:buSzTx/>
+              <a:buNone/>
+              <a:tabLst/>
+            </a:pPr>
+            <a:r>
+              <a:rPr kumimoji="0" lang="pl-PL" altLang="pl-PL" sz="1700" b="1" i="0" u="none" strike="noStrike" cap="none" normalizeH="0" baseline="0" dirty="0">
+                <a:ln>
+                  <a:noFill/>
+                </a:ln>
+                <a:solidFill>
+                  <a:srgbClr val="ECECEC"/>
+                </a:solidFill>
+                <a:effectLst/>
+                <a:cs typeface="Times New Roman" panose="02020603050405020304" pitchFamily="18" charset="0"/>
+              </a:rPr>
+              <a:t>1.Zdarzenia myszy</a:t>
+            </a:r>
+            <a:r>
+              <a:rPr kumimoji="0" lang="pl-PL" altLang="pl-PL" sz="1700" b="0" i="0" u="none" strike="noStrike" cap="none" normalizeH="0" baseline="0" dirty="0">
+                <a:ln>
+                  <a:noFill/>
+                </a:ln>
+                <a:solidFill>
+                  <a:srgbClr val="ECECEC"/>
+                </a:solidFill>
+                <a:effectLst/>
+                <a:cs typeface="Times New Roman" panose="02020603050405020304" pitchFamily="18" charset="0"/>
+              </a:rPr>
+              <a:t>: W obu bibliotekach możemy reagować na zdarzenia myszy takie jak kliknięcia i przeciąganie elementów za pomocą metod obsługi zdarzeń, takich jak </a:t>
+            </a:r>
+            <a:r>
+              <a:rPr kumimoji="0" lang="pl-PL" altLang="pl-PL" sz="1700" b="0" i="0" u="none" strike="noStrike" cap="none" normalizeH="0" baseline="0" dirty="0" err="1">
+                <a:ln>
+                  <a:noFill/>
+                </a:ln>
+                <a:solidFill>
+                  <a:srgbClr val="ECECEC"/>
+                </a:solidFill>
+                <a:effectLst/>
+                <a:cs typeface="Times New Roman" panose="02020603050405020304" pitchFamily="18" charset="0"/>
+              </a:rPr>
+              <a:t>mousePressEvent</a:t>
+            </a:r>
+            <a:r>
+              <a:rPr kumimoji="0" lang="pl-PL" altLang="pl-PL" sz="1700" b="0" i="0" u="none" strike="noStrike" cap="none" normalizeH="0" baseline="0" dirty="0">
+                <a:ln>
+                  <a:noFill/>
+                </a:ln>
+                <a:solidFill>
+                  <a:srgbClr val="ECECEC"/>
+                </a:solidFill>
+                <a:effectLst/>
+                <a:cs typeface="Times New Roman" panose="02020603050405020304" pitchFamily="18" charset="0"/>
+              </a:rPr>
+              <a:t>() i </a:t>
+            </a:r>
+            <a:r>
+              <a:rPr kumimoji="0" lang="pl-PL" altLang="pl-PL" sz="1700" b="0" i="0" u="none" strike="noStrike" cap="none" normalizeH="0" baseline="0" dirty="0" err="1">
+                <a:ln>
+                  <a:noFill/>
+                </a:ln>
+                <a:solidFill>
+                  <a:srgbClr val="ECECEC"/>
+                </a:solidFill>
+                <a:effectLst/>
+                <a:cs typeface="Times New Roman" panose="02020603050405020304" pitchFamily="18" charset="0"/>
+              </a:rPr>
+              <a:t>mouseMoveEvent</a:t>
+            </a:r>
+            <a:r>
+              <a:rPr kumimoji="0" lang="pl-PL" altLang="pl-PL" sz="1700" b="0" i="0" u="none" strike="noStrike" cap="none" normalizeH="0" baseline="0" dirty="0">
+                <a:ln>
+                  <a:noFill/>
+                </a:ln>
+                <a:solidFill>
+                  <a:srgbClr val="ECECEC"/>
+                </a:solidFill>
+                <a:effectLst/>
+                <a:cs typeface="Times New Roman" panose="02020603050405020304" pitchFamily="18" charset="0"/>
+              </a:rPr>
+              <a:t>() w PyQt6 oraz bind() w </a:t>
+            </a:r>
+            <a:r>
+              <a:rPr kumimoji="0" lang="pl-PL" altLang="pl-PL" sz="1700" b="0" i="0" u="none" strike="noStrike" cap="none" normalizeH="0" baseline="0" dirty="0" err="1">
+                <a:ln>
+                  <a:noFill/>
+                </a:ln>
+                <a:solidFill>
+                  <a:srgbClr val="ECECEC"/>
+                </a:solidFill>
+                <a:effectLst/>
+                <a:cs typeface="Times New Roman" panose="02020603050405020304" pitchFamily="18" charset="0"/>
+              </a:rPr>
+              <a:t>Tkinter</a:t>
+            </a:r>
+            <a:r>
+              <a:rPr kumimoji="0" lang="pl-PL" altLang="pl-PL" sz="1700" b="0" i="0" u="none" strike="noStrike" cap="none" normalizeH="0" baseline="0" dirty="0">
+                <a:ln>
+                  <a:noFill/>
+                </a:ln>
+                <a:solidFill>
+                  <a:srgbClr val="ECECEC"/>
+                </a:solidFill>
+                <a:effectLst/>
+                <a:cs typeface="Times New Roman" panose="02020603050405020304" pitchFamily="18" charset="0"/>
+              </a:rPr>
+              <a:t>.</a:t>
+            </a:r>
+          </a:p>
+          <a:p>
+            <a:pPr marL="0" marR="0" lvl="0" indent="0" algn="l" defTabSz="914400" rtl="0" eaLnBrk="0" fontAlgn="base" latinLnBrk="0" hangingPunct="0">
+              <a:lnSpc>
+                <a:spcPct val="100000"/>
+              </a:lnSpc>
+              <a:spcBef>
+                <a:spcPct val="0"/>
+              </a:spcBef>
+              <a:spcAft>
+                <a:spcPct val="0"/>
+              </a:spcAft>
+              <a:buClrTx/>
+              <a:buSzTx/>
+              <a:buNone/>
+              <a:tabLst/>
+            </a:pPr>
+            <a:r>
+              <a:rPr kumimoji="0" lang="pl-PL" altLang="pl-PL" sz="1700" b="1" i="0" u="none" strike="noStrike" cap="none" normalizeH="0" baseline="0" dirty="0">
+                <a:ln>
+                  <a:noFill/>
+                </a:ln>
+                <a:solidFill>
+                  <a:srgbClr val="ECECEC"/>
+                </a:solidFill>
+                <a:effectLst/>
+                <a:cs typeface="Times New Roman" panose="02020603050405020304" pitchFamily="18" charset="0"/>
+              </a:rPr>
+              <a:t>2.Zdarzenia klawiatury: </a:t>
+            </a:r>
+            <a:r>
+              <a:rPr kumimoji="0" lang="pl-PL" altLang="pl-PL" sz="1700" b="0" i="0" u="none" strike="noStrike" cap="none" normalizeH="0" baseline="0" dirty="0">
+                <a:ln>
+                  <a:noFill/>
+                </a:ln>
+                <a:solidFill>
+                  <a:srgbClr val="ECECEC"/>
+                </a:solidFill>
+                <a:effectLst/>
+                <a:cs typeface="Times New Roman" panose="02020603050405020304" pitchFamily="18" charset="0"/>
+              </a:rPr>
+              <a:t>Możemy obsługiwać zdarzenia klawiatury, takie jak naciśnięcia klawiszy, używając metod takich jak </a:t>
+            </a:r>
+            <a:r>
+              <a:rPr kumimoji="0" lang="pl-PL" altLang="pl-PL" sz="1700" b="0" i="0" u="none" strike="noStrike" cap="none" normalizeH="0" baseline="0" dirty="0" err="1">
+                <a:ln>
+                  <a:noFill/>
+                </a:ln>
+                <a:solidFill>
+                  <a:srgbClr val="ECECEC"/>
+                </a:solidFill>
+                <a:effectLst/>
+                <a:cs typeface="Times New Roman" panose="02020603050405020304" pitchFamily="18" charset="0"/>
+              </a:rPr>
+              <a:t>keyPressEvent</a:t>
+            </a:r>
+            <a:r>
+              <a:rPr kumimoji="0" lang="pl-PL" altLang="pl-PL" sz="1700" b="0" i="0" u="none" strike="noStrike" cap="none" normalizeH="0" baseline="0" dirty="0">
+                <a:ln>
+                  <a:noFill/>
+                </a:ln>
+                <a:solidFill>
+                  <a:srgbClr val="ECECEC"/>
+                </a:solidFill>
+                <a:effectLst/>
+                <a:cs typeface="Times New Roman" panose="02020603050405020304" pitchFamily="18" charset="0"/>
+              </a:rPr>
+              <a:t>() w PyQt6 lub bind() w </a:t>
+            </a:r>
+            <a:r>
+              <a:rPr kumimoji="0" lang="pl-PL" altLang="pl-PL" sz="1700" b="0" i="0" u="none" strike="noStrike" cap="none" normalizeH="0" baseline="0" dirty="0" err="1">
+                <a:ln>
+                  <a:noFill/>
+                </a:ln>
+                <a:solidFill>
+                  <a:srgbClr val="ECECEC"/>
+                </a:solidFill>
+                <a:effectLst/>
+                <a:cs typeface="Times New Roman" panose="02020603050405020304" pitchFamily="18" charset="0"/>
+              </a:rPr>
+              <a:t>Tkinter</a:t>
+            </a:r>
+            <a:r>
+              <a:rPr kumimoji="0" lang="pl-PL" altLang="pl-PL" sz="1700" b="0" i="0" u="none" strike="noStrike" cap="none" normalizeH="0" baseline="0" dirty="0">
+                <a:ln>
+                  <a:noFill/>
+                </a:ln>
+                <a:solidFill>
+                  <a:srgbClr val="ECECEC"/>
+                </a:solidFill>
+                <a:effectLst/>
+                <a:cs typeface="Times New Roman" panose="02020603050405020304" pitchFamily="18" charset="0"/>
+              </a:rPr>
+              <a:t>.</a:t>
+            </a:r>
+          </a:p>
+          <a:p>
+            <a:pPr marL="0" marR="0" lvl="0" indent="0" algn="l" defTabSz="914400" rtl="0" eaLnBrk="0" fontAlgn="base" latinLnBrk="0" hangingPunct="0">
+              <a:lnSpc>
+                <a:spcPct val="100000"/>
+              </a:lnSpc>
+              <a:spcBef>
+                <a:spcPct val="0"/>
+              </a:spcBef>
+              <a:spcAft>
+                <a:spcPct val="0"/>
+              </a:spcAft>
+              <a:buClrTx/>
+              <a:buSzTx/>
+              <a:buNone/>
+              <a:tabLst/>
+            </a:pPr>
+            <a:r>
+              <a:rPr kumimoji="0" lang="pl-PL" altLang="pl-PL" sz="1700" b="1" i="0" u="none" strike="noStrike" cap="none" normalizeH="0" baseline="0" dirty="0">
+                <a:ln>
+                  <a:noFill/>
+                </a:ln>
+                <a:solidFill>
+                  <a:srgbClr val="ECECEC"/>
+                </a:solidFill>
+                <a:effectLst/>
+                <a:cs typeface="Times New Roman" panose="02020603050405020304" pitchFamily="18" charset="0"/>
+              </a:rPr>
+              <a:t>3.Zdarzenia na akcje użytkownika: </a:t>
+            </a:r>
+            <a:r>
+              <a:rPr kumimoji="0" lang="pl-PL" altLang="pl-PL" sz="1700" b="0" i="0" u="none" strike="noStrike" cap="none" normalizeH="0" baseline="0" dirty="0">
+                <a:ln>
+                  <a:noFill/>
+                </a:ln>
+                <a:solidFill>
+                  <a:srgbClr val="ECECEC"/>
+                </a:solidFill>
+                <a:effectLst/>
+                <a:cs typeface="Times New Roman" panose="02020603050405020304" pitchFamily="18" charset="0"/>
+              </a:rPr>
+              <a:t>W obu bibliotekach możemy reagować na zdarzenia takie jak kliknięcia, najechania myszą, zmiany wartości itp., używając metod obsługi zdarzeń, takich jak </a:t>
+            </a:r>
+            <a:r>
+              <a:rPr kumimoji="0" lang="pl-PL" altLang="pl-PL" sz="1700" b="0" i="0" u="none" strike="noStrike" cap="none" normalizeH="0" baseline="0" dirty="0" err="1">
+                <a:ln>
+                  <a:noFill/>
+                </a:ln>
+                <a:solidFill>
+                  <a:srgbClr val="ECECEC"/>
+                </a:solidFill>
+                <a:effectLst/>
+                <a:cs typeface="Times New Roman" panose="02020603050405020304" pitchFamily="18" charset="0"/>
+              </a:rPr>
+              <a:t>clicked</a:t>
+            </a:r>
+            <a:r>
+              <a:rPr kumimoji="0" lang="pl-PL" altLang="pl-PL" sz="1700" b="0" i="0" u="none" strike="noStrike" cap="none" normalizeH="0" baseline="0" dirty="0">
+                <a:ln>
+                  <a:noFill/>
+                </a:ln>
+                <a:solidFill>
+                  <a:srgbClr val="ECECEC"/>
+                </a:solidFill>
+                <a:effectLst/>
+                <a:cs typeface="Times New Roman" panose="02020603050405020304" pitchFamily="18" charset="0"/>
+              </a:rPr>
+              <a:t>, </a:t>
+            </a:r>
+            <a:r>
+              <a:rPr kumimoji="0" lang="pl-PL" altLang="pl-PL" sz="1700" b="0" i="0" u="none" strike="noStrike" cap="none" normalizeH="0" baseline="0" dirty="0" err="1">
+                <a:ln>
+                  <a:noFill/>
+                </a:ln>
+                <a:solidFill>
+                  <a:srgbClr val="ECECEC"/>
+                </a:solidFill>
+                <a:effectLst/>
+                <a:cs typeface="Times New Roman" panose="02020603050405020304" pitchFamily="18" charset="0"/>
+              </a:rPr>
+              <a:t>hoverEnterEvent</a:t>
+            </a:r>
+            <a:r>
+              <a:rPr kumimoji="0" lang="pl-PL" altLang="pl-PL" sz="1700" b="0" i="0" u="none" strike="noStrike" cap="none" normalizeH="0" baseline="0" dirty="0">
+                <a:ln>
+                  <a:noFill/>
+                </a:ln>
+                <a:solidFill>
+                  <a:srgbClr val="ECECEC"/>
+                </a:solidFill>
+                <a:effectLst/>
+                <a:cs typeface="Times New Roman" panose="02020603050405020304" pitchFamily="18" charset="0"/>
+              </a:rPr>
+              <a:t>, </a:t>
+            </a:r>
+            <a:r>
+              <a:rPr kumimoji="0" lang="pl-PL" altLang="pl-PL" sz="1700" b="0" i="0" u="none" strike="noStrike" cap="none" normalizeH="0" baseline="0" dirty="0" err="1">
+                <a:ln>
+                  <a:noFill/>
+                </a:ln>
+                <a:solidFill>
+                  <a:srgbClr val="ECECEC"/>
+                </a:solidFill>
+                <a:effectLst/>
+                <a:cs typeface="Times New Roman" panose="02020603050405020304" pitchFamily="18" charset="0"/>
+              </a:rPr>
+              <a:t>valueChanged</a:t>
+            </a:r>
+            <a:r>
+              <a:rPr kumimoji="0" lang="pl-PL" altLang="pl-PL" sz="1700" b="0" i="0" u="none" strike="noStrike" cap="none" normalizeH="0" baseline="0" dirty="0">
+                <a:ln>
+                  <a:noFill/>
+                </a:ln>
+                <a:solidFill>
+                  <a:srgbClr val="ECECEC"/>
+                </a:solidFill>
+                <a:effectLst/>
+                <a:cs typeface="Times New Roman" panose="02020603050405020304" pitchFamily="18" charset="0"/>
+              </a:rPr>
+              <a:t> itp.</a:t>
+            </a:r>
           </a:p>
         </p:txBody>
       </p:sp>
     </p:spTree>
     <p:extLst>
       <p:ext uri="{BB962C8B-B14F-4D97-AF65-F5344CB8AC3E}">
-        <p14:creationId xmlns:p14="http://schemas.microsoft.com/office/powerpoint/2010/main" val="3139879800"/>
+        <p14:creationId xmlns:p14="http://schemas.microsoft.com/office/powerpoint/2010/main" val="4230066697"/>
       </p:ext>
     </p:extLst>
   </p:cSld>
@@ -3528,7 +4744,7 @@
           <p:cNvPr id="2" name="Tytuł 1">
             <a:extLst>
               <a:ext uri="{FF2B5EF4-FFF2-40B4-BE49-F238E27FC236}">
-                <a16:creationId xmlns:a16="http://schemas.microsoft.com/office/drawing/2014/main" id="{E10B648A-54E5-4093-4EF4-98872014B5A6}"/>
+                <a16:creationId xmlns:a16="http://schemas.microsoft.com/office/drawing/2014/main" id="{B76C569E-9576-8559-0E27-AD1C3248971E}"/>
               </a:ext>
             </a:extLst>
           </p:cNvPr>
@@ -3539,12 +4755,7 @@
             <p:ph type="title"/>
           </p:nvPr>
         </p:nvSpPr>
-        <p:spPr>
-          <a:xfrm>
-            <a:off x="838200" y="365125"/>
-            <a:ext cx="10515600" cy="5759228"/>
-          </a:xfrm>
-        </p:spPr>
+        <p:spPr/>
         <p:txBody>
           <a:bodyPr>
             <a:normAutofit/>
@@ -3553,16 +4764,42 @@
           <a:p>
             <a:pPr algn="ctr"/>
             <a:r>
-              <a:rPr lang="pl-PL" sz="5500" dirty="0"/>
-              <a:t>CHCEMY TO SAMO OKNO</a:t>
-            </a:r>
+              <a:rPr lang="pl-PL" sz="5400" dirty="0" err="1"/>
+              <a:t>QtDesigner</a:t>
+            </a:r>
+            <a:endParaRPr lang="pl-PL" sz="5400" dirty="0"/>
+          </a:p>
+        </p:txBody>
+      </p:sp>
+      <p:sp>
+        <p:nvSpPr>
+          <p:cNvPr id="3" name="Symbol zastępczy zawartości 2">
+            <a:extLst>
+              <a:ext uri="{FF2B5EF4-FFF2-40B4-BE49-F238E27FC236}">
+                <a16:creationId xmlns:a16="http://schemas.microsoft.com/office/drawing/2014/main" id="{469B423E-48CF-5BC1-6391-52EF9BA8845B}"/>
+              </a:ext>
+            </a:extLst>
+          </p:cNvPr>
+          <p:cNvSpPr>
+            <a:spLocks noGrp="1"/>
+          </p:cNvSpPr>
+          <p:nvPr>
+            <p:ph idx="1"/>
+          </p:nvPr>
+        </p:nvSpPr>
+        <p:spPr/>
+        <p:txBody>
+          <a:bodyPr/>
+          <a:lstStyle/>
+          <a:p>
+            <a:endParaRPr lang="pl-PL" dirty="0"/>
           </a:p>
         </p:txBody>
       </p:sp>
     </p:spTree>
     <p:extLst>
       <p:ext uri="{BB962C8B-B14F-4D97-AF65-F5344CB8AC3E}">
-        <p14:creationId xmlns:p14="http://schemas.microsoft.com/office/powerpoint/2010/main" val="1359932627"/>
+        <p14:creationId xmlns:p14="http://schemas.microsoft.com/office/powerpoint/2010/main" val="3139879800"/>
       </p:ext>
     </p:extLst>
   </p:cSld>
@@ -3594,7 +4831,7 @@
           <p:cNvPr id="2" name="Tytuł 1">
             <a:extLst>
               <a:ext uri="{FF2B5EF4-FFF2-40B4-BE49-F238E27FC236}">
-                <a16:creationId xmlns:a16="http://schemas.microsoft.com/office/drawing/2014/main" id="{2E7DD19D-6DC6-BBA2-70CD-784B9115DD1F}"/>
+                <a16:creationId xmlns:a16="http://schemas.microsoft.com/office/drawing/2014/main" id="{E2269E5B-378A-7BDB-4B9B-1D060F71D772}"/>
               </a:ext>
             </a:extLst>
           </p:cNvPr>
@@ -3605,7 +4842,101 @@
             <p:ph type="title"/>
           </p:nvPr>
         </p:nvSpPr>
-        <p:spPr/>
+        <p:spPr>
+          <a:xfrm>
+            <a:off x="838200" y="2766219"/>
+            <a:ext cx="10515600" cy="1325563"/>
+          </a:xfrm>
+        </p:spPr>
+        <p:txBody>
+          <a:bodyPr>
+            <a:noAutofit/>
+          </a:bodyPr>
+          <a:lstStyle/>
+          <a:p>
+            <a:pPr algn="ctr"/>
+            <a:r>
+              <a:rPr lang="pl-PL" sz="6000" dirty="0"/>
+              <a:t>PORÓWNANIA</a:t>
+            </a:r>
+            <a:br>
+              <a:rPr lang="pl-PL" sz="6000" dirty="0"/>
+            </a:br>
+            <a:r>
+              <a:rPr lang="pl-PL" sz="6000" dirty="0"/>
+              <a:t>Qt6 vs </a:t>
+            </a:r>
+            <a:r>
+              <a:rPr lang="pl-PL" sz="6000" dirty="0" err="1"/>
+              <a:t>Tktinker</a:t>
+            </a:r>
+            <a:br>
+              <a:rPr lang="pl-PL" sz="6000" dirty="0"/>
+            </a:br>
+            <a:r>
+              <a:rPr lang="pl-PL" sz="6000" dirty="0"/>
+              <a:t>+ Qt6 vs </a:t>
+            </a:r>
+            <a:r>
+              <a:rPr lang="pl-PL" sz="6000" dirty="0" err="1"/>
+              <a:t>JavaFX</a:t>
+            </a:r>
+            <a:endParaRPr lang="pl-PL" sz="6000" dirty="0"/>
+          </a:p>
+        </p:txBody>
+      </p:sp>
+    </p:spTree>
+    <p:extLst>
+      <p:ext uri="{BB962C8B-B14F-4D97-AF65-F5344CB8AC3E}">
+        <p14:creationId xmlns:p14="http://schemas.microsoft.com/office/powerpoint/2010/main" val="1640224575"/>
+      </p:ext>
+    </p:extLst>
+  </p:cSld>
+  <p:clrMapOvr>
+    <a:masterClrMapping/>
+  </p:clrMapOvr>
+</p:sld>
+</file>
+
+<file path=ppt/slides/slide5.xml><?xml version="1.0" encoding="utf-8"?>
+<p:sld xmlns:a="http://schemas.openxmlformats.org/drawingml/2006/main" xmlns:r="http://schemas.openxmlformats.org/officeDocument/2006/relationships" xmlns:p="http://schemas.openxmlformats.org/presentationml/2006/main">
+  <p:cSld>
+    <p:spTree>
+      <p:nvGrpSpPr>
+        <p:cNvPr id="1" name=""/>
+        <p:cNvGrpSpPr/>
+        <p:nvPr/>
+      </p:nvGrpSpPr>
+      <p:grpSpPr>
+        <a:xfrm>
+          <a:off x="0" y="0"/>
+          <a:ext cx="0" cy="0"/>
+          <a:chOff x="0" y="0"/>
+          <a:chExt cx="0" cy="0"/>
+        </a:xfrm>
+      </p:grpSpPr>
+      <p:sp>
+        <p:nvSpPr>
+          <p:cNvPr id="2" name="Tytuł 1">
+            <a:extLst>
+              <a:ext uri="{FF2B5EF4-FFF2-40B4-BE49-F238E27FC236}">
+                <a16:creationId xmlns:a16="http://schemas.microsoft.com/office/drawing/2014/main" id="{E10B648A-54E5-4093-4EF4-98872014B5A6}"/>
+              </a:ext>
+            </a:extLst>
+          </p:cNvPr>
+          <p:cNvSpPr>
+            <a:spLocks noGrp="1"/>
+          </p:cNvSpPr>
+          <p:nvPr>
+            <p:ph type="title"/>
+          </p:nvPr>
+        </p:nvSpPr>
+        <p:spPr>
+          <a:xfrm>
+            <a:off x="838200" y="365125"/>
+            <a:ext cx="10515600" cy="5759228"/>
+          </a:xfrm>
+        </p:spPr>
         <p:txBody>
           <a:bodyPr>
             <a:normAutofit/>
@@ -3615,36 +4946,292 @@
             <a:pPr algn="ctr"/>
             <a:r>
               <a:rPr lang="pl-PL" sz="5500" dirty="0"/>
+              <a:t>CHCEMY TO SAMO OKNO</a:t>
+            </a:r>
+          </a:p>
+        </p:txBody>
+      </p:sp>
+    </p:spTree>
+    <p:extLst>
+      <p:ext uri="{BB962C8B-B14F-4D97-AF65-F5344CB8AC3E}">
+        <p14:creationId xmlns:p14="http://schemas.microsoft.com/office/powerpoint/2010/main" val="1359932627"/>
+      </p:ext>
+    </p:extLst>
+  </p:cSld>
+  <p:clrMapOvr>
+    <a:masterClrMapping/>
+  </p:clrMapOvr>
+</p:sld>
+</file>
+
+<file path=ppt/slides/slide6.xml><?xml version="1.0" encoding="utf-8"?>
+<p:sld xmlns:a="http://schemas.openxmlformats.org/drawingml/2006/main" xmlns:r="http://schemas.openxmlformats.org/officeDocument/2006/relationships" xmlns:p="http://schemas.openxmlformats.org/presentationml/2006/main">
+  <p:cSld>
+    <p:spTree>
+      <p:nvGrpSpPr>
+        <p:cNvPr id="1" name=""/>
+        <p:cNvGrpSpPr/>
+        <p:nvPr/>
+      </p:nvGrpSpPr>
+      <p:grpSpPr>
+        <a:xfrm>
+          <a:off x="0" y="0"/>
+          <a:ext cx="0" cy="0"/>
+          <a:chOff x="0" y="0"/>
+          <a:chExt cx="0" cy="0"/>
+        </a:xfrm>
+      </p:grpSpPr>
+      <p:sp>
+        <p:nvSpPr>
+          <p:cNvPr id="8" name="Prostokąt 7">
+            <a:extLst>
+              <a:ext uri="{FF2B5EF4-FFF2-40B4-BE49-F238E27FC236}">
+                <a16:creationId xmlns:a16="http://schemas.microsoft.com/office/drawing/2014/main" id="{FEDA2507-5C02-0E93-F84C-E51969EAC783}"/>
+              </a:ext>
+            </a:extLst>
+          </p:cNvPr>
+          <p:cNvSpPr/>
+          <p:nvPr/>
+        </p:nvSpPr>
+        <p:spPr>
+          <a:xfrm>
+            <a:off x="0" y="0"/>
+            <a:ext cx="12192000" cy="801724"/>
+          </a:xfrm>
+          <a:prstGeom prst="rect">
+            <a:avLst/>
+          </a:prstGeom>
+          <a:solidFill>
+            <a:schemeClr val="accent2">
+              <a:lumMod val="75000"/>
+            </a:schemeClr>
+          </a:solidFill>
+        </p:spPr>
+        <p:style>
+          <a:lnRef idx="2">
+            <a:schemeClr val="accent1">
+              <a:shade val="15000"/>
+            </a:schemeClr>
+          </a:lnRef>
+          <a:fillRef idx="1">
+            <a:schemeClr val="accent1"/>
+          </a:fillRef>
+          <a:effectRef idx="0">
+            <a:schemeClr val="accent1"/>
+          </a:effectRef>
+          <a:fontRef idx="minor">
+            <a:schemeClr val="lt1"/>
+          </a:fontRef>
+        </p:style>
+        <p:txBody>
+          <a:bodyPr rtlCol="0" anchor="ctr"/>
+          <a:lstStyle/>
+          <a:p>
+            <a:pPr algn="ctr"/>
+            <a:endParaRPr lang="pl-PL"/>
+          </a:p>
+        </p:txBody>
+      </p:sp>
+      <p:sp>
+        <p:nvSpPr>
+          <p:cNvPr id="2" name="Tytuł 1">
+            <a:extLst>
+              <a:ext uri="{FF2B5EF4-FFF2-40B4-BE49-F238E27FC236}">
+                <a16:creationId xmlns:a16="http://schemas.microsoft.com/office/drawing/2014/main" id="{2E7DD19D-6DC6-BBA2-70CD-784B9115DD1F}"/>
+              </a:ext>
+            </a:extLst>
+          </p:cNvPr>
+          <p:cNvSpPr>
+            <a:spLocks noGrp="1"/>
+          </p:cNvSpPr>
+          <p:nvPr>
+            <p:ph type="title"/>
+          </p:nvPr>
+        </p:nvSpPr>
+        <p:spPr>
+          <a:xfrm>
+            <a:off x="838200" y="437970"/>
+            <a:ext cx="10515600" cy="1325563"/>
+          </a:xfrm>
+        </p:spPr>
+        <p:txBody>
+          <a:bodyPr>
+            <a:normAutofit fontScale="90000"/>
+          </a:bodyPr>
+          <a:lstStyle/>
+          <a:p>
+            <a:pPr algn="ctr"/>
+            <a:r>
+              <a:rPr lang="pl-PL" sz="5500" dirty="0"/>
               <a:t>TABELA</a:t>
             </a:r>
-          </a:p>
-        </p:txBody>
-      </p:sp>
-      <p:sp>
-        <p:nvSpPr>
-          <p:cNvPr id="3" name="Symbol zastępczy zawartości 2">
-            <a:extLst>
-              <a:ext uri="{FF2B5EF4-FFF2-40B4-BE49-F238E27FC236}">
-                <a16:creationId xmlns:a16="http://schemas.microsoft.com/office/drawing/2014/main" id="{CFC97368-50E9-7D5B-5BFA-0A8C5651117F}"/>
-              </a:ext>
-            </a:extLst>
-          </p:cNvPr>
-          <p:cNvSpPr>
-            <a:spLocks noGrp="1"/>
-          </p:cNvSpPr>
-          <p:nvPr>
-            <p:ph idx="1"/>
-          </p:nvPr>
-        </p:nvSpPr>
-        <p:spPr/>
-        <p:txBody>
-          <a:bodyPr/>
-          <a:lstStyle/>
-          <a:p>
-            <a:endParaRPr lang="pl-PL"/>
-          </a:p>
-        </p:txBody>
-      </p:sp>
+            <a:br>
+              <a:rPr lang="pl-PL" sz="5500" dirty="0"/>
+            </a:br>
+            <a:br>
+              <a:rPr lang="pl-PL" sz="5500" dirty="0"/>
+            </a:br>
+            <a:r>
+              <a:rPr lang="pl-PL" sz="5500" dirty="0"/>
+              <a:t>VS</a:t>
+            </a:r>
+          </a:p>
+        </p:txBody>
+      </p:sp>
+      <p:pic>
+        <p:nvPicPr>
+          <p:cNvPr id="5" name="Obraz 4">
+            <a:extLst>
+              <a:ext uri="{FF2B5EF4-FFF2-40B4-BE49-F238E27FC236}">
+                <a16:creationId xmlns:a16="http://schemas.microsoft.com/office/drawing/2014/main" id="{1EA2835C-9BC3-1CD3-6ED2-4194975106D6}"/>
+              </a:ext>
+            </a:extLst>
+          </p:cNvPr>
+          <p:cNvPicPr>
+            <a:picLocks noChangeAspect="1"/>
+          </p:cNvPicPr>
+          <p:nvPr/>
+        </p:nvPicPr>
+        <p:blipFill>
+          <a:blip r:embed="rId2"/>
+          <a:stretch>
+            <a:fillRect/>
+          </a:stretch>
+        </p:blipFill>
+        <p:spPr>
+          <a:xfrm>
+            <a:off x="150616" y="2595717"/>
+            <a:ext cx="5791022" cy="4019166"/>
+          </a:xfrm>
+          <a:prstGeom prst="rect">
+            <a:avLst/>
+          </a:prstGeom>
+        </p:spPr>
+      </p:pic>
+      <p:pic>
+        <p:nvPicPr>
+          <p:cNvPr id="1026" name="Picture 2">
+            <a:extLst>
+              <a:ext uri="{FF2B5EF4-FFF2-40B4-BE49-F238E27FC236}">
+                <a16:creationId xmlns:a16="http://schemas.microsoft.com/office/drawing/2014/main" id="{B6FB270C-5265-2AFB-1478-13829F409C02}"/>
+              </a:ext>
+            </a:extLst>
+          </p:cNvPr>
+          <p:cNvPicPr>
+            <a:picLocks noChangeAspect="1" noChangeArrowheads="1"/>
+          </p:cNvPicPr>
+          <p:nvPr/>
+        </p:nvPicPr>
+        <p:blipFill>
+          <a:blip r:embed="rId3">
+            <a:extLst>
+              <a:ext uri="{28A0092B-C50C-407E-A947-70E740481C1C}">
+                <a14:useLocalDpi xmlns:a14="http://schemas.microsoft.com/office/drawing/2010/main" val="0"/>
+              </a:ext>
+            </a:extLst>
+          </a:blip>
+          <a:srcRect/>
+          <a:stretch>
+            <a:fillRect/>
+          </a:stretch>
+        </p:blipFill>
+        <p:spPr bwMode="auto">
+          <a:xfrm>
+            <a:off x="1573160" y="1110584"/>
+            <a:ext cx="2438400" cy="838200"/>
+          </a:xfrm>
+          <a:prstGeom prst="rect">
+            <a:avLst/>
+          </a:prstGeom>
+          <a:noFill/>
+          <a:extLst>
+            <a:ext uri="{909E8E84-426E-40DD-AFC4-6F175D3DCCD1}">
+              <a14:hiddenFill xmlns:a14="http://schemas.microsoft.com/office/drawing/2010/main">
+                <a:solidFill>
+                  <a:srgbClr val="FFFFFF"/>
+                </a:solidFill>
+              </a14:hiddenFill>
+            </a:ext>
+          </a:extLst>
+        </p:spPr>
+      </p:pic>
+      <p:pic>
+        <p:nvPicPr>
+          <p:cNvPr id="7" name="Obraz 6">
+            <a:extLst>
+              <a:ext uri="{FF2B5EF4-FFF2-40B4-BE49-F238E27FC236}">
+                <a16:creationId xmlns:a16="http://schemas.microsoft.com/office/drawing/2014/main" id="{9E5D96F3-42EA-3831-EA4E-5CAAC2683BE4}"/>
+              </a:ext>
+            </a:extLst>
+          </p:cNvPr>
+          <p:cNvPicPr>
+            <a:picLocks noChangeAspect="1"/>
+          </p:cNvPicPr>
+          <p:nvPr/>
+        </p:nvPicPr>
+        <p:blipFill>
+          <a:blip r:embed="rId4"/>
+          <a:stretch>
+            <a:fillRect/>
+          </a:stretch>
+        </p:blipFill>
+        <p:spPr>
+          <a:xfrm>
+            <a:off x="6250364" y="2595718"/>
+            <a:ext cx="5789176" cy="4019165"/>
+          </a:xfrm>
+          <a:prstGeom prst="rect">
+            <a:avLst/>
+          </a:prstGeom>
+        </p:spPr>
+      </p:pic>
+      <p:pic>
+        <p:nvPicPr>
+          <p:cNvPr id="1028" name="Picture 4">
+            <a:extLst>
+              <a:ext uri="{FF2B5EF4-FFF2-40B4-BE49-F238E27FC236}">
+                <a16:creationId xmlns:a16="http://schemas.microsoft.com/office/drawing/2014/main" id="{1AE0A56A-3554-0CF0-BFF4-6C1DBA1EECF5}"/>
+              </a:ext>
+            </a:extLst>
+          </p:cNvPr>
+          <p:cNvPicPr>
+            <a:picLocks noChangeAspect="1" noChangeArrowheads="1"/>
+          </p:cNvPicPr>
+          <p:nvPr/>
+        </p:nvPicPr>
+        <p:blipFill>
+          <a:blip r:embed="rId5">
+            <a:extLst>
+              <a:ext uri="{28A0092B-C50C-407E-A947-70E740481C1C}">
+                <a14:useLocalDpi xmlns:a14="http://schemas.microsoft.com/office/drawing/2010/main" val="0"/>
+              </a:ext>
+            </a:extLst>
+          </a:blip>
+          <a:srcRect/>
+          <a:stretch>
+            <a:fillRect/>
+          </a:stretch>
+        </p:blipFill>
+        <p:spPr bwMode="auto">
+          <a:xfrm>
+            <a:off x="8180442" y="986975"/>
+            <a:ext cx="2553926" cy="1085418"/>
+          </a:xfrm>
+          <a:prstGeom prst="rect">
+            <a:avLst/>
+          </a:prstGeom>
+          <a:noFill/>
+          <a:extLst>
+            <a:ext uri="{909E8E84-426E-40DD-AFC4-6F175D3DCCD1}">
+              <a14:hiddenFill xmlns:a14="http://schemas.microsoft.com/office/drawing/2010/main">
+                <a:solidFill>
+                  <a:srgbClr val="FFFFFF"/>
+                </a:solidFill>
+              </a14:hiddenFill>
+            </a:ext>
+          </a:extLst>
+        </p:spPr>
+      </p:pic>
     </p:spTree>
     <p:extLst>
       <p:ext uri="{BB962C8B-B14F-4D97-AF65-F5344CB8AC3E}">
@@ -3658,7 +5245,251 @@
 </p:sld>
 </file>
 
-<file path=ppt/slides/slide5.xml><?xml version="1.0" encoding="utf-8"?>
+<file path=ppt/slides/slide7.xml><?xml version="1.0" encoding="utf-8"?>
+<p:sld xmlns:a="http://schemas.openxmlformats.org/drawingml/2006/main" xmlns:r="http://schemas.openxmlformats.org/officeDocument/2006/relationships" xmlns:p="http://schemas.openxmlformats.org/presentationml/2006/main">
+  <p:cSld>
+    <p:spTree>
+      <p:nvGrpSpPr>
+        <p:cNvPr id="1" name=""/>
+        <p:cNvGrpSpPr/>
+        <p:nvPr/>
+      </p:nvGrpSpPr>
+      <p:grpSpPr>
+        <a:xfrm>
+          <a:off x="0" y="0"/>
+          <a:ext cx="0" cy="0"/>
+          <a:chOff x="0" y="0"/>
+          <a:chExt cx="0" cy="0"/>
+        </a:xfrm>
+      </p:grpSpPr>
+      <p:pic>
+        <p:nvPicPr>
+          <p:cNvPr id="4" name="Picture 2">
+            <a:extLst>
+              <a:ext uri="{FF2B5EF4-FFF2-40B4-BE49-F238E27FC236}">
+                <a16:creationId xmlns:a16="http://schemas.microsoft.com/office/drawing/2014/main" id="{1A262BEB-6207-F054-5C26-EA3A63ECCEBF}"/>
+              </a:ext>
+            </a:extLst>
+          </p:cNvPr>
+          <p:cNvPicPr>
+            <a:picLocks noChangeAspect="1" noChangeArrowheads="1"/>
+          </p:cNvPicPr>
+          <p:nvPr/>
+        </p:nvPicPr>
+        <p:blipFill>
+          <a:blip r:embed="rId2">
+            <a:extLst>
+              <a:ext uri="{28A0092B-C50C-407E-A947-70E740481C1C}">
+                <a14:useLocalDpi xmlns:a14="http://schemas.microsoft.com/office/drawing/2010/main" val="0"/>
+              </a:ext>
+            </a:extLst>
+          </a:blip>
+          <a:srcRect/>
+          <a:stretch>
+            <a:fillRect/>
+          </a:stretch>
+        </p:blipFill>
+        <p:spPr bwMode="auto">
+          <a:xfrm>
+            <a:off x="1661937" y="0"/>
+            <a:ext cx="2438400" cy="838200"/>
+          </a:xfrm>
+          <a:prstGeom prst="rect">
+            <a:avLst/>
+          </a:prstGeom>
+          <a:noFill/>
+          <a:extLst>
+            <a:ext uri="{909E8E84-426E-40DD-AFC4-6F175D3DCCD1}">
+              <a14:hiddenFill xmlns:a14="http://schemas.microsoft.com/office/drawing/2010/main">
+                <a:solidFill>
+                  <a:srgbClr val="FFFFFF"/>
+                </a:solidFill>
+              </a14:hiddenFill>
+            </a:ext>
+          </a:extLst>
+        </p:spPr>
+      </p:pic>
+      <p:pic>
+        <p:nvPicPr>
+          <p:cNvPr id="5" name="Picture 4">
+            <a:extLst>
+              <a:ext uri="{FF2B5EF4-FFF2-40B4-BE49-F238E27FC236}">
+                <a16:creationId xmlns:a16="http://schemas.microsoft.com/office/drawing/2014/main" id="{084468C3-49C3-1E39-31A7-8C74CAFC4AB2}"/>
+              </a:ext>
+            </a:extLst>
+          </p:cNvPr>
+          <p:cNvPicPr>
+            <a:picLocks noChangeAspect="1" noChangeArrowheads="1"/>
+          </p:cNvPicPr>
+          <p:nvPr/>
+        </p:nvPicPr>
+        <p:blipFill>
+          <a:blip r:embed="rId3">
+            <a:extLst>
+              <a:ext uri="{28A0092B-C50C-407E-A947-70E740481C1C}">
+                <a14:useLocalDpi xmlns:a14="http://schemas.microsoft.com/office/drawing/2010/main" val="0"/>
+              </a:ext>
+            </a:extLst>
+          </a:blip>
+          <a:srcRect/>
+          <a:stretch>
+            <a:fillRect/>
+          </a:stretch>
+        </p:blipFill>
+        <p:spPr bwMode="auto">
+          <a:xfrm>
+            <a:off x="7976137" y="0"/>
+            <a:ext cx="1957976" cy="832139"/>
+          </a:xfrm>
+          <a:prstGeom prst="rect">
+            <a:avLst/>
+          </a:prstGeom>
+          <a:noFill/>
+          <a:extLst>
+            <a:ext uri="{909E8E84-426E-40DD-AFC4-6F175D3DCCD1}">
+              <a14:hiddenFill xmlns:a14="http://schemas.microsoft.com/office/drawing/2010/main">
+                <a:solidFill>
+                  <a:srgbClr val="FFFFFF"/>
+                </a:solidFill>
+              </a14:hiddenFill>
+            </a:ext>
+          </a:extLst>
+        </p:spPr>
+      </p:pic>
+      <p:pic>
+        <p:nvPicPr>
+          <p:cNvPr id="7" name="Obraz 6">
+            <a:extLst>
+              <a:ext uri="{FF2B5EF4-FFF2-40B4-BE49-F238E27FC236}">
+                <a16:creationId xmlns:a16="http://schemas.microsoft.com/office/drawing/2014/main" id="{0D4D02FA-AAA6-7E3C-D9A8-50015389002E}"/>
+              </a:ext>
+            </a:extLst>
+          </p:cNvPr>
+          <p:cNvPicPr>
+            <a:picLocks noChangeAspect="1"/>
+          </p:cNvPicPr>
+          <p:nvPr/>
+        </p:nvPicPr>
+        <p:blipFill>
+          <a:blip r:embed="rId4"/>
+          <a:stretch>
+            <a:fillRect/>
+          </a:stretch>
+        </p:blipFill>
+        <p:spPr>
+          <a:xfrm>
+            <a:off x="146688" y="3280173"/>
+            <a:ext cx="4875098" cy="3179690"/>
+          </a:xfrm>
+          <a:prstGeom prst="rect">
+            <a:avLst/>
+          </a:prstGeom>
+        </p:spPr>
+      </p:pic>
+      <p:pic>
+        <p:nvPicPr>
+          <p:cNvPr id="9" name="Obraz 8">
+            <a:extLst>
+              <a:ext uri="{FF2B5EF4-FFF2-40B4-BE49-F238E27FC236}">
+                <a16:creationId xmlns:a16="http://schemas.microsoft.com/office/drawing/2014/main" id="{9C2AC9E6-8485-A93E-61C2-CF99FDEB7951}"/>
+              </a:ext>
+            </a:extLst>
+          </p:cNvPr>
+          <p:cNvPicPr>
+            <a:picLocks noChangeAspect="1"/>
+          </p:cNvPicPr>
+          <p:nvPr/>
+        </p:nvPicPr>
+        <p:blipFill>
+          <a:blip r:embed="rId5"/>
+          <a:stretch>
+            <a:fillRect/>
+          </a:stretch>
+        </p:blipFill>
+        <p:spPr>
+          <a:xfrm>
+            <a:off x="146688" y="1167925"/>
+            <a:ext cx="4882512" cy="2153753"/>
+          </a:xfrm>
+          <a:prstGeom prst="rect">
+            <a:avLst/>
+          </a:prstGeom>
+        </p:spPr>
+      </p:pic>
+      <p:pic>
+        <p:nvPicPr>
+          <p:cNvPr id="11" name="Obraz 10">
+            <a:extLst>
+              <a:ext uri="{FF2B5EF4-FFF2-40B4-BE49-F238E27FC236}">
+                <a16:creationId xmlns:a16="http://schemas.microsoft.com/office/drawing/2014/main" id="{65646927-C9CA-66D8-0876-1F176FAE9208}"/>
+              </a:ext>
+            </a:extLst>
+          </p:cNvPr>
+          <p:cNvPicPr>
+            <a:picLocks noChangeAspect="1"/>
+          </p:cNvPicPr>
+          <p:nvPr/>
+        </p:nvPicPr>
+        <p:blipFill>
+          <a:blip r:embed="rId6"/>
+          <a:stretch>
+            <a:fillRect/>
+          </a:stretch>
+        </p:blipFill>
+        <p:spPr>
+          <a:xfrm>
+            <a:off x="6096000" y="792005"/>
+            <a:ext cx="5661977" cy="3179690"/>
+          </a:xfrm>
+          <a:prstGeom prst="rect">
+            <a:avLst/>
+          </a:prstGeom>
+        </p:spPr>
+      </p:pic>
+      <p:pic>
+        <p:nvPicPr>
+          <p:cNvPr id="13" name="Obraz 12">
+            <a:extLst>
+              <a:ext uri="{FF2B5EF4-FFF2-40B4-BE49-F238E27FC236}">
+                <a16:creationId xmlns:a16="http://schemas.microsoft.com/office/drawing/2014/main" id="{5E033D28-2B8C-C08A-9611-321D91D97D91}"/>
+              </a:ext>
+            </a:extLst>
+          </p:cNvPr>
+          <p:cNvPicPr>
+            <a:picLocks noChangeAspect="1"/>
+          </p:cNvPicPr>
+          <p:nvPr/>
+        </p:nvPicPr>
+        <p:blipFill>
+          <a:blip r:embed="rId7"/>
+          <a:stretch>
+            <a:fillRect/>
+          </a:stretch>
+        </p:blipFill>
+        <p:spPr>
+          <a:xfrm>
+            <a:off x="6096000" y="3971695"/>
+            <a:ext cx="5661977" cy="2784705"/>
+          </a:xfrm>
+          <a:prstGeom prst="rect">
+            <a:avLst/>
+          </a:prstGeom>
+        </p:spPr>
+      </p:pic>
+    </p:spTree>
+    <p:extLst>
+      <p:ext uri="{BB962C8B-B14F-4D97-AF65-F5344CB8AC3E}">
+        <p14:creationId xmlns:p14="http://schemas.microsoft.com/office/powerpoint/2010/main" val="3236981944"/>
+      </p:ext>
+    </p:extLst>
+  </p:cSld>
+  <p:clrMapOvr>
+    <a:masterClrMapping/>
+  </p:clrMapOvr>
+</p:sld>
+</file>
+
+<file path=ppt/slides/slide8.xml><?xml version="1.0" encoding="utf-8"?>
 <p:sld xmlns:a="http://schemas.openxmlformats.org/drawingml/2006/main" xmlns:r="http://schemas.openxmlformats.org/officeDocument/2006/relationships" xmlns:p="http://schemas.openxmlformats.org/presentationml/2006/main">
   <p:cSld>
     <p:spTree>

</xml_diff>